<commit_message>
LIve Data Extraction - Windows Service
</commit_message>
<xml_diff>
--- a/Documents/Technical/Help/UserManual/New Microsoft PowerPoint Presentation.pptx
+++ b/Documents/Technical/Help/UserManual/New Microsoft PowerPoint Presentation.pptx
@@ -5,12 +5,14 @@
     <p:sldMasterId id="2147483648" r:id="rId1"/>
   </p:sldMasterIdLst>
   <p:notesMasterIdLst>
-    <p:notesMasterId r:id="rId5"/>
+    <p:notesMasterId r:id="rId7"/>
   </p:notesMasterIdLst>
   <p:sldIdLst>
     <p:sldId id="256" r:id="rId2"/>
     <p:sldId id="258" r:id="rId3"/>
     <p:sldId id="259" r:id="rId4"/>
+    <p:sldId id="261" r:id="rId5"/>
+    <p:sldId id="260" r:id="rId6"/>
   </p:sldIdLst>
   <p:sldSz cx="9144000" cy="6858000" type="screen4x3"/>
   <p:notesSz cx="6858000" cy="9144000"/>
@@ -194,7 +196,7 @@
           <a:p>
             <a:fld id="{2685F925-F09D-4542-A91E-18699BAAF622}" type="datetimeFigureOut">
               <a:rPr lang="en-US" smtClean="0"/>
-              <a:t>2/23/2017</a:t>
+              <a:t>3/7/2017</a:t>
             </a:fld>
             <a:endParaRPr lang="en-US"/>
           </a:p>
@@ -728,7 +730,7 @@
             <a:fld id="{1D8BD707-D9CF-40AE-B4C6-C98DA3205C09}" type="datetimeFigureOut">
               <a:rPr lang="en-US" smtClean="0"/>
               <a:pPr/>
-              <a:t>2/23/2017</a:t>
+              <a:t>3/7/2017</a:t>
             </a:fld>
             <a:endParaRPr lang="en-US"/>
           </a:p>
@@ -895,7 +897,7 @@
             <a:fld id="{1D8BD707-D9CF-40AE-B4C6-C98DA3205C09}" type="datetimeFigureOut">
               <a:rPr lang="en-US" smtClean="0"/>
               <a:pPr/>
-              <a:t>2/23/2017</a:t>
+              <a:t>3/7/2017</a:t>
             </a:fld>
             <a:endParaRPr lang="en-US"/>
           </a:p>
@@ -1072,7 +1074,7 @@
             <a:fld id="{1D8BD707-D9CF-40AE-B4C6-C98DA3205C09}" type="datetimeFigureOut">
               <a:rPr lang="en-US" smtClean="0"/>
               <a:pPr/>
-              <a:t>2/23/2017</a:t>
+              <a:t>3/7/2017</a:t>
             </a:fld>
             <a:endParaRPr lang="en-US"/>
           </a:p>
@@ -1239,7 +1241,7 @@
             <a:fld id="{1D8BD707-D9CF-40AE-B4C6-C98DA3205C09}" type="datetimeFigureOut">
               <a:rPr lang="en-US" smtClean="0"/>
               <a:pPr/>
-              <a:t>2/23/2017</a:t>
+              <a:t>3/7/2017</a:t>
             </a:fld>
             <a:endParaRPr lang="en-US"/>
           </a:p>
@@ -1482,7 +1484,7 @@
             <a:fld id="{1D8BD707-D9CF-40AE-B4C6-C98DA3205C09}" type="datetimeFigureOut">
               <a:rPr lang="en-US" smtClean="0"/>
               <a:pPr/>
-              <a:t>2/23/2017</a:t>
+              <a:t>3/7/2017</a:t>
             </a:fld>
             <a:endParaRPr lang="en-US"/>
           </a:p>
@@ -1767,7 +1769,7 @@
             <a:fld id="{1D8BD707-D9CF-40AE-B4C6-C98DA3205C09}" type="datetimeFigureOut">
               <a:rPr lang="en-US" smtClean="0"/>
               <a:pPr/>
-              <a:t>2/23/2017</a:t>
+              <a:t>3/7/2017</a:t>
             </a:fld>
             <a:endParaRPr lang="en-US"/>
           </a:p>
@@ -2186,7 +2188,7 @@
             <a:fld id="{1D8BD707-D9CF-40AE-B4C6-C98DA3205C09}" type="datetimeFigureOut">
               <a:rPr lang="en-US" smtClean="0"/>
               <a:pPr/>
-              <a:t>2/23/2017</a:t>
+              <a:t>3/7/2017</a:t>
             </a:fld>
             <a:endParaRPr lang="en-US"/>
           </a:p>
@@ -2301,7 +2303,7 @@
             <a:fld id="{1D8BD707-D9CF-40AE-B4C6-C98DA3205C09}" type="datetimeFigureOut">
               <a:rPr lang="en-US" smtClean="0"/>
               <a:pPr/>
-              <a:t>2/23/2017</a:t>
+              <a:t>3/7/2017</a:t>
             </a:fld>
             <a:endParaRPr lang="en-US"/>
           </a:p>
@@ -2393,7 +2395,7 @@
             <a:fld id="{1D8BD707-D9CF-40AE-B4C6-C98DA3205C09}" type="datetimeFigureOut">
               <a:rPr lang="en-US" smtClean="0"/>
               <a:pPr/>
-              <a:t>2/23/2017</a:t>
+              <a:t>3/7/2017</a:t>
             </a:fld>
             <a:endParaRPr lang="en-US"/>
           </a:p>
@@ -2667,7 +2669,7 @@
             <a:fld id="{1D8BD707-D9CF-40AE-B4C6-C98DA3205C09}" type="datetimeFigureOut">
               <a:rPr lang="en-US" smtClean="0"/>
               <a:pPr/>
-              <a:t>2/23/2017</a:t>
+              <a:t>3/7/2017</a:t>
             </a:fld>
             <a:endParaRPr lang="en-US"/>
           </a:p>
@@ -2917,7 +2919,7 @@
             <a:fld id="{1D8BD707-D9CF-40AE-B4C6-C98DA3205C09}" type="datetimeFigureOut">
               <a:rPr lang="en-US" smtClean="0"/>
               <a:pPr/>
-              <a:t>2/23/2017</a:t>
+              <a:t>3/7/2017</a:t>
             </a:fld>
             <a:endParaRPr lang="en-US"/>
           </a:p>
@@ -3127,7 +3129,7 @@
             <a:fld id="{1D8BD707-D9CF-40AE-B4C6-C98DA3205C09}" type="datetimeFigureOut">
               <a:rPr lang="en-US" smtClean="0"/>
               <a:pPr/>
-              <a:t>2/23/2017</a:t>
+              <a:t>3/7/2017</a:t>
             </a:fld>
             <a:endParaRPr lang="en-US"/>
           </a:p>
@@ -4392,7 +4394,6 @@
               <a:rPr lang="en-US" sz="1000" dirty="0"/>
               <a:t>3</a:t>
             </a:r>
-            <a:endParaRPr lang="en-US" sz="1000" dirty="0"/>
           </a:p>
         </p:txBody>
       </p:sp>
@@ -4427,7 +4428,6 @@
               <a:rPr lang="en-US" sz="1000" dirty="0"/>
               <a:t>2</a:t>
             </a:r>
-            <a:endParaRPr lang="en-US" sz="1000" dirty="0"/>
           </a:p>
         </p:txBody>
       </p:sp>
@@ -4462,7 +4462,6 @@
               <a:rPr lang="en-US" sz="1000" dirty="0"/>
               <a:t>4</a:t>
             </a:r>
-            <a:endParaRPr lang="en-US" sz="1000" dirty="0"/>
           </a:p>
         </p:txBody>
       </p:sp>
@@ -4531,10 +4530,752 @@
           <a:chExt cx="0" cy="0"/>
         </a:xfrm>
       </p:grpSpPr>
+      <p:pic>
+        <p:nvPicPr>
+          <p:cNvPr id="1026" name="Picture 2"/>
+          <p:cNvPicPr>
+            <a:picLocks noChangeAspect="1" noChangeArrowheads="1"/>
+          </p:cNvPicPr>
+          <p:nvPr/>
+        </p:nvPicPr>
+        <p:blipFill>
+          <a:blip r:embed="rId2">
+            <a:extLst>
+              <a:ext uri="{28A0092B-C50C-407E-A947-70E740481C1C}">
+                <a14:useLocalDpi xmlns:a14="http://schemas.microsoft.com/office/drawing/2010/main" val="0"/>
+              </a:ext>
+            </a:extLst>
+          </a:blip>
+          <a:srcRect/>
+          <a:stretch>
+            <a:fillRect/>
+          </a:stretch>
+        </p:blipFill>
+        <p:spPr bwMode="auto">
+          <a:xfrm>
+            <a:off x="1066800" y="2524124"/>
+            <a:ext cx="6629400" cy="3302987"/>
+          </a:xfrm>
+          <a:prstGeom prst="rect">
+            <a:avLst/>
+          </a:prstGeom>
+          <a:noFill/>
+          <a:ln>
+            <a:noFill/>
+          </a:ln>
+          <a:effectLst/>
+          <a:extLst>
+            <a:ext uri="{909E8E84-426E-40DD-AFC4-6F175D3DCCD1}">
+              <a14:hiddenFill xmlns:a14="http://schemas.microsoft.com/office/drawing/2010/main">
+                <a:solidFill>
+                  <a:schemeClr val="accent1"/>
+                </a:solidFill>
+              </a14:hiddenFill>
+            </a:ext>
+            <a:ext uri="{91240B29-F687-4F45-9708-019B960494DF}">
+              <a14:hiddenLine xmlns:a14="http://schemas.microsoft.com/office/drawing/2010/main" w="9525">
+                <a:solidFill>
+                  <a:schemeClr val="tx1"/>
+                </a:solidFill>
+                <a:miter lim="800000"/>
+                <a:headEnd/>
+                <a:tailEnd/>
+              </a14:hiddenLine>
+            </a:ext>
+            <a:ext uri="{AF507438-7753-43E0-B8FC-AC1667EBCBE1}">
+              <a14:hiddenEffects xmlns:a14="http://schemas.microsoft.com/office/drawing/2010/main">
+                <a:effectLst>
+                  <a:outerShdw dist="35921" dir="2700000" algn="ctr" rotWithShape="0">
+                    <a:schemeClr val="bg2"/>
+                  </a:outerShdw>
+                </a:effectLst>
+              </a14:hiddenEffects>
+            </a:ext>
+          </a:extLst>
+        </p:spPr>
+      </p:pic>
+      <p:cxnSp>
+        <p:nvCxnSpPr>
+          <p:cNvPr id="7" name="Straight Connector 6"/>
+          <p:cNvCxnSpPr>
+            <a:stCxn id="23" idx="2"/>
+          </p:cNvCxnSpPr>
+          <p:nvPr/>
+        </p:nvCxnSpPr>
+        <p:spPr>
+          <a:xfrm flipH="1">
+            <a:off x="1953814" y="2332910"/>
+            <a:ext cx="5953" cy="1096090"/>
+          </a:xfrm>
+          <a:prstGeom prst="line">
+            <a:avLst/>
+          </a:prstGeom>
+          <a:ln w="19050">
+            <a:solidFill>
+              <a:srgbClr val="FF0000"/>
+            </a:solidFill>
+            <a:tailEnd type="oval"/>
+          </a:ln>
+        </p:spPr>
+        <p:style>
+          <a:lnRef idx="1">
+            <a:schemeClr val="accent1"/>
+          </a:lnRef>
+          <a:fillRef idx="0">
+            <a:schemeClr val="accent1"/>
+          </a:fillRef>
+          <a:effectRef idx="0">
+            <a:schemeClr val="accent1"/>
+          </a:effectRef>
+          <a:fontRef idx="minor">
+            <a:schemeClr val="tx1"/>
+          </a:fontRef>
+        </p:style>
+      </p:cxnSp>
+      <p:cxnSp>
+        <p:nvCxnSpPr>
+          <p:cNvPr id="8" name="Straight Connector 7"/>
+          <p:cNvCxnSpPr>
+            <a:stCxn id="22" idx="2"/>
+          </p:cNvCxnSpPr>
+          <p:nvPr/>
+        </p:nvCxnSpPr>
+        <p:spPr>
+          <a:xfrm>
+            <a:off x="2947988" y="2332910"/>
+            <a:ext cx="0" cy="1096090"/>
+          </a:xfrm>
+          <a:prstGeom prst="line">
+            <a:avLst/>
+          </a:prstGeom>
+          <a:ln w="19050">
+            <a:solidFill>
+              <a:srgbClr val="FF0000"/>
+            </a:solidFill>
+            <a:tailEnd type="oval"/>
+          </a:ln>
+        </p:spPr>
+        <p:style>
+          <a:lnRef idx="1">
+            <a:schemeClr val="accent1"/>
+          </a:lnRef>
+          <a:fillRef idx="0">
+            <a:schemeClr val="accent1"/>
+          </a:fillRef>
+          <a:effectRef idx="0">
+            <a:schemeClr val="accent1"/>
+          </a:effectRef>
+          <a:fontRef idx="minor">
+            <a:schemeClr val="tx1"/>
+          </a:fontRef>
+        </p:style>
+      </p:cxnSp>
+      <p:cxnSp>
+        <p:nvCxnSpPr>
+          <p:cNvPr id="9" name="Straight Connector 8"/>
+          <p:cNvCxnSpPr/>
+          <p:nvPr/>
+        </p:nvCxnSpPr>
+        <p:spPr>
+          <a:xfrm>
+            <a:off x="6858000" y="2133600"/>
+            <a:ext cx="0" cy="0"/>
+          </a:xfrm>
+          <a:prstGeom prst="line">
+            <a:avLst/>
+          </a:prstGeom>
+          <a:ln w="19050">
+            <a:solidFill>
+              <a:srgbClr val="FF0000"/>
+            </a:solidFill>
+            <a:tailEnd type="oval"/>
+          </a:ln>
+        </p:spPr>
+        <p:style>
+          <a:lnRef idx="1">
+            <a:schemeClr val="accent1"/>
+          </a:lnRef>
+          <a:fillRef idx="0">
+            <a:schemeClr val="accent1"/>
+          </a:fillRef>
+          <a:effectRef idx="0">
+            <a:schemeClr val="accent1"/>
+          </a:effectRef>
+          <a:fontRef idx="minor">
+            <a:schemeClr val="tx1"/>
+          </a:fontRef>
+        </p:style>
+      </p:cxnSp>
+      <p:cxnSp>
+        <p:nvCxnSpPr>
+          <p:cNvPr id="10" name="Straight Connector 9"/>
+          <p:cNvCxnSpPr/>
+          <p:nvPr/>
+        </p:nvCxnSpPr>
+        <p:spPr>
+          <a:xfrm flipH="1">
+            <a:off x="7496176" y="3141821"/>
+            <a:ext cx="933448" cy="0"/>
+          </a:xfrm>
+          <a:prstGeom prst="line">
+            <a:avLst/>
+          </a:prstGeom>
+          <a:ln w="19050">
+            <a:solidFill>
+              <a:srgbClr val="FF0000"/>
+            </a:solidFill>
+            <a:tailEnd type="oval"/>
+          </a:ln>
+        </p:spPr>
+        <p:style>
+          <a:lnRef idx="1">
+            <a:schemeClr val="accent1"/>
+          </a:lnRef>
+          <a:fillRef idx="0">
+            <a:schemeClr val="accent1"/>
+          </a:fillRef>
+          <a:effectRef idx="0">
+            <a:schemeClr val="accent1"/>
+          </a:effectRef>
+          <a:fontRef idx="minor">
+            <a:schemeClr val="tx1"/>
+          </a:fontRef>
+        </p:style>
+      </p:cxnSp>
+      <p:cxnSp>
+        <p:nvCxnSpPr>
+          <p:cNvPr id="11" name="Straight Connector 10"/>
+          <p:cNvCxnSpPr/>
+          <p:nvPr/>
+        </p:nvCxnSpPr>
+        <p:spPr>
+          <a:xfrm flipH="1">
+            <a:off x="7496176" y="3505200"/>
+            <a:ext cx="609600" cy="0"/>
+          </a:xfrm>
+          <a:prstGeom prst="line">
+            <a:avLst/>
+          </a:prstGeom>
+          <a:ln w="19050">
+            <a:solidFill>
+              <a:srgbClr val="FF0000"/>
+            </a:solidFill>
+            <a:tailEnd type="oval"/>
+          </a:ln>
+        </p:spPr>
+        <p:style>
+          <a:lnRef idx="1">
+            <a:schemeClr val="accent1"/>
+          </a:lnRef>
+          <a:fillRef idx="0">
+            <a:schemeClr val="accent1"/>
+          </a:fillRef>
+          <a:effectRef idx="0">
+            <a:schemeClr val="accent1"/>
+          </a:effectRef>
+          <a:fontRef idx="minor">
+            <a:schemeClr val="tx1"/>
+          </a:fontRef>
+        </p:style>
+      </p:cxnSp>
+      <p:cxnSp>
+        <p:nvCxnSpPr>
+          <p:cNvPr id="12" name="Straight Connector 11"/>
+          <p:cNvCxnSpPr/>
+          <p:nvPr/>
+        </p:nvCxnSpPr>
+        <p:spPr>
+          <a:xfrm flipH="1">
+            <a:off x="7596188" y="4006312"/>
+            <a:ext cx="509588" cy="0"/>
+          </a:xfrm>
+          <a:prstGeom prst="line">
+            <a:avLst/>
+          </a:prstGeom>
+          <a:ln w="19050">
+            <a:solidFill>
+              <a:srgbClr val="FF0000"/>
+            </a:solidFill>
+            <a:tailEnd type="oval"/>
+          </a:ln>
+        </p:spPr>
+        <p:style>
+          <a:lnRef idx="1">
+            <a:schemeClr val="accent1"/>
+          </a:lnRef>
+          <a:fillRef idx="0">
+            <a:schemeClr val="accent1"/>
+          </a:fillRef>
+          <a:effectRef idx="0">
+            <a:schemeClr val="accent1"/>
+          </a:effectRef>
+          <a:fontRef idx="minor">
+            <a:schemeClr val="tx1"/>
+          </a:fontRef>
+        </p:style>
+      </p:cxnSp>
+      <p:cxnSp>
+        <p:nvCxnSpPr>
+          <p:cNvPr id="13" name="Straight Connector 12"/>
+          <p:cNvCxnSpPr/>
+          <p:nvPr/>
+        </p:nvCxnSpPr>
+        <p:spPr>
+          <a:xfrm flipH="1">
+            <a:off x="7467600" y="4724400"/>
+            <a:ext cx="661986" cy="0"/>
+          </a:xfrm>
+          <a:prstGeom prst="line">
+            <a:avLst/>
+          </a:prstGeom>
+          <a:ln w="19050">
+            <a:solidFill>
+              <a:srgbClr val="FF0000"/>
+            </a:solidFill>
+            <a:tailEnd type="oval"/>
+          </a:ln>
+        </p:spPr>
+        <p:style>
+          <a:lnRef idx="1">
+            <a:schemeClr val="accent1"/>
+          </a:lnRef>
+          <a:fillRef idx="0">
+            <a:schemeClr val="accent1"/>
+          </a:fillRef>
+          <a:effectRef idx="0">
+            <a:schemeClr val="accent1"/>
+          </a:effectRef>
+          <a:fontRef idx="minor">
+            <a:schemeClr val="tx1"/>
+          </a:fontRef>
+        </p:style>
+      </p:cxnSp>
+      <p:cxnSp>
+        <p:nvCxnSpPr>
+          <p:cNvPr id="14" name="Straight Connector 13"/>
+          <p:cNvCxnSpPr/>
+          <p:nvPr/>
+        </p:nvCxnSpPr>
+        <p:spPr>
+          <a:xfrm flipH="1">
+            <a:off x="6934200" y="5011579"/>
+            <a:ext cx="1495424" cy="0"/>
+          </a:xfrm>
+          <a:prstGeom prst="line">
+            <a:avLst/>
+          </a:prstGeom>
+          <a:ln w="19050">
+            <a:solidFill>
+              <a:srgbClr val="FF0000"/>
+            </a:solidFill>
+            <a:tailEnd type="oval"/>
+          </a:ln>
+        </p:spPr>
+        <p:style>
+          <a:lnRef idx="1">
+            <a:schemeClr val="accent1"/>
+          </a:lnRef>
+          <a:fillRef idx="0">
+            <a:schemeClr val="accent1"/>
+          </a:fillRef>
+          <a:effectRef idx="0">
+            <a:schemeClr val="accent1"/>
+          </a:effectRef>
+          <a:fontRef idx="minor">
+            <a:schemeClr val="tx1"/>
+          </a:fontRef>
+        </p:style>
+      </p:cxnSp>
+      <p:cxnSp>
+        <p:nvCxnSpPr>
+          <p:cNvPr id="15" name="Straight Connector 14"/>
+          <p:cNvCxnSpPr>
+            <a:stCxn id="21" idx="1"/>
+          </p:cNvCxnSpPr>
+          <p:nvPr/>
+        </p:nvCxnSpPr>
+        <p:spPr>
+          <a:xfrm flipH="1">
+            <a:off x="6934200" y="5181600"/>
+            <a:ext cx="1195386" cy="0"/>
+          </a:xfrm>
+          <a:prstGeom prst="line">
+            <a:avLst/>
+          </a:prstGeom>
+          <a:ln w="19050">
+            <a:solidFill>
+              <a:srgbClr val="FF0000"/>
+            </a:solidFill>
+            <a:tailEnd type="oval"/>
+          </a:ln>
+        </p:spPr>
+        <p:style>
+          <a:lnRef idx="1">
+            <a:schemeClr val="accent1"/>
+          </a:lnRef>
+          <a:fillRef idx="0">
+            <a:schemeClr val="accent1"/>
+          </a:fillRef>
+          <a:effectRef idx="0">
+            <a:schemeClr val="accent1"/>
+          </a:effectRef>
+          <a:fontRef idx="minor">
+            <a:schemeClr val="tx1"/>
+          </a:fontRef>
+        </p:style>
+      </p:cxnSp>
+      <p:sp>
+        <p:nvSpPr>
+          <p:cNvPr id="16" name="TextBox 15"/>
+          <p:cNvSpPr txBox="1"/>
+          <p:nvPr/>
+        </p:nvSpPr>
+        <p:spPr>
+          <a:xfrm>
+            <a:off x="8429624" y="2971800"/>
+            <a:ext cx="200024" cy="246221"/>
+          </a:xfrm>
+          <a:prstGeom prst="rect">
+            <a:avLst/>
+          </a:prstGeom>
+          <a:noFill/>
+          <a:ln w="19050">
+            <a:solidFill>
+              <a:srgbClr val="FF0000"/>
+            </a:solidFill>
+          </a:ln>
+        </p:spPr>
+        <p:txBody>
+          <a:bodyPr wrap="square" rtlCol="0">
+            <a:spAutoFit/>
+          </a:bodyPr>
+          <a:lstStyle/>
+          <a:p>
+            <a:pPr algn="ctr"/>
+            <a:r>
+              <a:rPr lang="en-US" sz="1000" dirty="0" smtClean="0"/>
+              <a:t>3</a:t>
+            </a:r>
+            <a:endParaRPr lang="en-US" sz="1000" dirty="0"/>
+          </a:p>
+        </p:txBody>
+      </p:sp>
+      <p:sp>
+        <p:nvSpPr>
+          <p:cNvPr id="17" name="TextBox 16"/>
+          <p:cNvSpPr txBox="1"/>
+          <p:nvPr/>
+        </p:nvSpPr>
+        <p:spPr>
+          <a:xfrm>
+            <a:off x="8105776" y="3305889"/>
+            <a:ext cx="200024" cy="246221"/>
+          </a:xfrm>
+          <a:prstGeom prst="rect">
+            <a:avLst/>
+          </a:prstGeom>
+          <a:noFill/>
+          <a:ln w="19050">
+            <a:solidFill>
+              <a:srgbClr val="FF0000"/>
+            </a:solidFill>
+          </a:ln>
+        </p:spPr>
+        <p:txBody>
+          <a:bodyPr wrap="square" rtlCol="0">
+            <a:spAutoFit/>
+          </a:bodyPr>
+          <a:lstStyle/>
+          <a:p>
+            <a:pPr algn="ctr"/>
+            <a:r>
+              <a:rPr lang="en-US" sz="1000" dirty="0" smtClean="0"/>
+              <a:t>4</a:t>
+            </a:r>
+            <a:endParaRPr lang="en-US" sz="1000" dirty="0"/>
+          </a:p>
+        </p:txBody>
+      </p:sp>
+      <p:sp>
+        <p:nvSpPr>
+          <p:cNvPr id="18" name="TextBox 17"/>
+          <p:cNvSpPr txBox="1"/>
+          <p:nvPr/>
+        </p:nvSpPr>
+        <p:spPr>
+          <a:xfrm>
+            <a:off x="8105776" y="3919871"/>
+            <a:ext cx="200024" cy="246221"/>
+          </a:xfrm>
+          <a:prstGeom prst="rect">
+            <a:avLst/>
+          </a:prstGeom>
+          <a:noFill/>
+          <a:ln w="19050">
+            <a:solidFill>
+              <a:srgbClr val="FF0000"/>
+            </a:solidFill>
+          </a:ln>
+        </p:spPr>
+        <p:txBody>
+          <a:bodyPr wrap="square" rtlCol="0">
+            <a:spAutoFit/>
+          </a:bodyPr>
+          <a:lstStyle/>
+          <a:p>
+            <a:pPr algn="ctr"/>
+            <a:r>
+              <a:rPr lang="en-US" sz="1000" dirty="0"/>
+              <a:t>5</a:t>
+            </a:r>
+            <a:endParaRPr lang="en-US" sz="1000" dirty="0"/>
+          </a:p>
+        </p:txBody>
+      </p:sp>
+      <p:sp>
+        <p:nvSpPr>
+          <p:cNvPr id="19" name="TextBox 18"/>
+          <p:cNvSpPr txBox="1"/>
+          <p:nvPr/>
+        </p:nvSpPr>
+        <p:spPr>
+          <a:xfrm>
+            <a:off x="8129586" y="4572000"/>
+            <a:ext cx="200024" cy="246221"/>
+          </a:xfrm>
+          <a:prstGeom prst="rect">
+            <a:avLst/>
+          </a:prstGeom>
+          <a:noFill/>
+          <a:ln w="19050">
+            <a:solidFill>
+              <a:srgbClr val="FF0000"/>
+            </a:solidFill>
+          </a:ln>
+        </p:spPr>
+        <p:txBody>
+          <a:bodyPr wrap="square" rtlCol="0">
+            <a:spAutoFit/>
+          </a:bodyPr>
+          <a:lstStyle/>
+          <a:p>
+            <a:pPr algn="ctr"/>
+            <a:r>
+              <a:rPr lang="en-US" sz="1000" dirty="0" smtClean="0"/>
+              <a:t>6</a:t>
+            </a:r>
+            <a:endParaRPr lang="en-US" sz="1000" dirty="0"/>
+          </a:p>
+        </p:txBody>
+      </p:sp>
+      <p:sp>
+        <p:nvSpPr>
+          <p:cNvPr id="20" name="TextBox 19"/>
+          <p:cNvSpPr txBox="1"/>
+          <p:nvPr/>
+        </p:nvSpPr>
+        <p:spPr>
+          <a:xfrm>
+            <a:off x="8429624" y="4935379"/>
+            <a:ext cx="200024" cy="246221"/>
+          </a:xfrm>
+          <a:prstGeom prst="rect">
+            <a:avLst/>
+          </a:prstGeom>
+          <a:noFill/>
+          <a:ln w="19050">
+            <a:solidFill>
+              <a:srgbClr val="FF0000"/>
+            </a:solidFill>
+          </a:ln>
+        </p:spPr>
+        <p:txBody>
+          <a:bodyPr wrap="square" rtlCol="0">
+            <a:spAutoFit/>
+          </a:bodyPr>
+          <a:lstStyle/>
+          <a:p>
+            <a:pPr algn="ctr"/>
+            <a:r>
+              <a:rPr lang="en-US" sz="1000" dirty="0" smtClean="0"/>
+              <a:t>7</a:t>
+            </a:r>
+            <a:endParaRPr lang="en-US" sz="1000" dirty="0"/>
+          </a:p>
+        </p:txBody>
+      </p:sp>
+      <p:sp>
+        <p:nvSpPr>
+          <p:cNvPr id="21" name="TextBox 20"/>
+          <p:cNvSpPr txBox="1"/>
+          <p:nvPr/>
+        </p:nvSpPr>
+        <p:spPr>
+          <a:xfrm>
+            <a:off x="8129586" y="5058489"/>
+            <a:ext cx="176212" cy="246221"/>
+          </a:xfrm>
+          <a:prstGeom prst="rect">
+            <a:avLst/>
+          </a:prstGeom>
+          <a:noFill/>
+          <a:ln w="19050">
+            <a:solidFill>
+              <a:srgbClr val="FF0000"/>
+            </a:solidFill>
+          </a:ln>
+        </p:spPr>
+        <p:txBody>
+          <a:bodyPr wrap="square" rtlCol="0">
+            <a:spAutoFit/>
+          </a:bodyPr>
+          <a:lstStyle/>
+          <a:p>
+            <a:pPr algn="ctr"/>
+            <a:r>
+              <a:rPr lang="en-US" sz="1000" dirty="0" smtClean="0"/>
+              <a:t>8</a:t>
+            </a:r>
+            <a:endParaRPr lang="en-US" sz="1000" dirty="0"/>
+          </a:p>
+        </p:txBody>
+      </p:sp>
+      <p:sp>
+        <p:nvSpPr>
+          <p:cNvPr id="22" name="TextBox 21"/>
+          <p:cNvSpPr txBox="1"/>
+          <p:nvPr/>
+        </p:nvSpPr>
+        <p:spPr>
+          <a:xfrm>
+            <a:off x="2847976" y="2086689"/>
+            <a:ext cx="200024" cy="246221"/>
+          </a:xfrm>
+          <a:prstGeom prst="rect">
+            <a:avLst/>
+          </a:prstGeom>
+          <a:noFill/>
+          <a:ln w="19050">
+            <a:solidFill>
+              <a:srgbClr val="FF0000"/>
+            </a:solidFill>
+          </a:ln>
+        </p:spPr>
+        <p:txBody>
+          <a:bodyPr wrap="square" rtlCol="0">
+            <a:spAutoFit/>
+          </a:bodyPr>
+          <a:lstStyle/>
+          <a:p>
+            <a:pPr algn="ctr"/>
+            <a:r>
+              <a:rPr lang="en-US" sz="1000" dirty="0" smtClean="0"/>
+              <a:t>2</a:t>
+            </a:r>
+            <a:endParaRPr lang="en-US" sz="1000" dirty="0"/>
+          </a:p>
+        </p:txBody>
+      </p:sp>
+      <p:sp>
+        <p:nvSpPr>
+          <p:cNvPr id="23" name="TextBox 22"/>
+          <p:cNvSpPr txBox="1"/>
+          <p:nvPr/>
+        </p:nvSpPr>
+        <p:spPr>
+          <a:xfrm>
+            <a:off x="1859755" y="2086689"/>
+            <a:ext cx="200024" cy="246221"/>
+          </a:xfrm>
+          <a:prstGeom prst="rect">
+            <a:avLst/>
+          </a:prstGeom>
+          <a:noFill/>
+          <a:ln w="19050">
+            <a:solidFill>
+              <a:srgbClr val="FF0000"/>
+            </a:solidFill>
+          </a:ln>
+        </p:spPr>
+        <p:txBody>
+          <a:bodyPr wrap="square" rtlCol="0">
+            <a:spAutoFit/>
+          </a:bodyPr>
+          <a:lstStyle/>
+          <a:p>
+            <a:pPr algn="ctr"/>
+            <a:r>
+              <a:rPr lang="en-US" sz="1000" dirty="0" smtClean="0"/>
+              <a:t>1</a:t>
+            </a:r>
+            <a:endParaRPr lang="en-US" sz="1000" dirty="0"/>
+          </a:p>
+        </p:txBody>
+      </p:sp>
     </p:spTree>
     <p:extLst>
       <p:ext uri="{BB962C8B-B14F-4D97-AF65-F5344CB8AC3E}">
         <p14:creationId xmlns:p14="http://schemas.microsoft.com/office/powerpoint/2010/main" val="4031749564"/>
+      </p:ext>
+    </p:extLst>
+  </p:cSld>
+  <p:clrMapOvr>
+    <a:masterClrMapping/>
+  </p:clrMapOvr>
+</p:sld>
+</file>
+
+<file path=ppt/slides/slide4.xml><?xml version="1.0" encoding="utf-8"?>
+<p:sld xmlns:a="http://schemas.openxmlformats.org/drawingml/2006/main" xmlns:r="http://schemas.openxmlformats.org/officeDocument/2006/relationships" xmlns:p="http://schemas.openxmlformats.org/presentationml/2006/main">
+  <p:cSld>
+    <p:spTree>
+      <p:nvGrpSpPr>
+        <p:cNvPr id="1" name=""/>
+        <p:cNvGrpSpPr/>
+        <p:nvPr/>
+      </p:nvGrpSpPr>
+      <p:grpSpPr>
+        <a:xfrm>
+          <a:off x="0" y="0"/>
+          <a:ext cx="0" cy="0"/>
+          <a:chOff x="0" y="0"/>
+          <a:chExt cx="0" cy="0"/>
+        </a:xfrm>
+      </p:grpSpPr>
+    </p:spTree>
+    <p:extLst>
+      <p:ext uri="{BB962C8B-B14F-4D97-AF65-F5344CB8AC3E}">
+        <p14:creationId xmlns:p14="http://schemas.microsoft.com/office/powerpoint/2010/main" val="321335075"/>
+      </p:ext>
+    </p:extLst>
+  </p:cSld>
+  <p:clrMapOvr>
+    <a:masterClrMapping/>
+  </p:clrMapOvr>
+</p:sld>
+</file>
+
+<file path=ppt/slides/slide5.xml><?xml version="1.0" encoding="utf-8"?>
+<p:sld xmlns:a="http://schemas.openxmlformats.org/drawingml/2006/main" xmlns:r="http://schemas.openxmlformats.org/officeDocument/2006/relationships" xmlns:p="http://schemas.openxmlformats.org/presentationml/2006/main">
+  <p:cSld>
+    <p:spTree>
+      <p:nvGrpSpPr>
+        <p:cNvPr id="1" name=""/>
+        <p:cNvGrpSpPr/>
+        <p:nvPr/>
+      </p:nvGrpSpPr>
+      <p:grpSpPr>
+        <a:xfrm>
+          <a:off x="0" y="0"/>
+          <a:ext cx="0" cy="0"/>
+          <a:chOff x="0" y="0"/>
+          <a:chExt cx="0" cy="0"/>
+        </a:xfrm>
+      </p:grpSpPr>
+    </p:spTree>
+    <p:extLst>
+      <p:ext uri="{BB962C8B-B14F-4D97-AF65-F5344CB8AC3E}">
+        <p14:creationId xmlns:p14="http://schemas.microsoft.com/office/powerpoint/2010/main" val="1467764718"/>
       </p:ext>
     </p:extLst>
   </p:cSld>

</xml_diff>

<commit_message>
Ver D1.4.2 Corrected: WebSite: Status Color displays grey immediately on first Save - corrections in status-circle.component.ts WebSite: Legend included in Compliance Form. WebSite: Compliance Form / Mandatory Sites : Editable Source date for all manual sites Indexes - work in progress
</commit_message>
<xml_diff>
--- a/Documents/Technical/Help/UserManual/New Microsoft PowerPoint Presentation.pptx
+++ b/Documents/Technical/Help/UserManual/New Microsoft PowerPoint Presentation.pptx
@@ -5,7 +5,7 @@
     <p:sldMasterId id="2147483648" r:id="rId1"/>
   </p:sldMasterIdLst>
   <p:notesMasterIdLst>
-    <p:notesMasterId r:id="rId7"/>
+    <p:notesMasterId r:id="rId15"/>
   </p:notesMasterIdLst>
   <p:sldIdLst>
     <p:sldId id="256" r:id="rId2"/>
@@ -13,6 +13,14 @@
     <p:sldId id="259" r:id="rId4"/>
     <p:sldId id="261" r:id="rId5"/>
     <p:sldId id="260" r:id="rId6"/>
+    <p:sldId id="262" r:id="rId7"/>
+    <p:sldId id="263" r:id="rId8"/>
+    <p:sldId id="264" r:id="rId9"/>
+    <p:sldId id="265" r:id="rId10"/>
+    <p:sldId id="266" r:id="rId11"/>
+    <p:sldId id="267" r:id="rId12"/>
+    <p:sldId id="268" r:id="rId13"/>
+    <p:sldId id="269" r:id="rId14"/>
   </p:sldIdLst>
   <p:sldSz cx="9144000" cy="6858000" type="screen4x3"/>
   <p:notesSz cx="6858000" cy="9144000"/>
@@ -196,7 +204,7 @@
           <a:p>
             <a:fld id="{2685F925-F09D-4542-A91E-18699BAAF622}" type="datetimeFigureOut">
               <a:rPr lang="en-US" smtClean="0"/>
-              <a:t>3/7/2017</a:t>
+              <a:t>4/5/2017</a:t>
             </a:fld>
             <a:endParaRPr lang="en-US"/>
           </a:p>
@@ -730,7 +738,7 @@
             <a:fld id="{1D8BD707-D9CF-40AE-B4C6-C98DA3205C09}" type="datetimeFigureOut">
               <a:rPr lang="en-US" smtClean="0"/>
               <a:pPr/>
-              <a:t>3/7/2017</a:t>
+              <a:t>4/5/2017</a:t>
             </a:fld>
             <a:endParaRPr lang="en-US"/>
           </a:p>
@@ -897,7 +905,7 @@
             <a:fld id="{1D8BD707-D9CF-40AE-B4C6-C98DA3205C09}" type="datetimeFigureOut">
               <a:rPr lang="en-US" smtClean="0"/>
               <a:pPr/>
-              <a:t>3/7/2017</a:t>
+              <a:t>4/5/2017</a:t>
             </a:fld>
             <a:endParaRPr lang="en-US"/>
           </a:p>
@@ -1074,7 +1082,7 @@
             <a:fld id="{1D8BD707-D9CF-40AE-B4C6-C98DA3205C09}" type="datetimeFigureOut">
               <a:rPr lang="en-US" smtClean="0"/>
               <a:pPr/>
-              <a:t>3/7/2017</a:t>
+              <a:t>4/5/2017</a:t>
             </a:fld>
             <a:endParaRPr lang="en-US"/>
           </a:p>
@@ -1241,7 +1249,7 @@
             <a:fld id="{1D8BD707-D9CF-40AE-B4C6-C98DA3205C09}" type="datetimeFigureOut">
               <a:rPr lang="en-US" smtClean="0"/>
               <a:pPr/>
-              <a:t>3/7/2017</a:t>
+              <a:t>4/5/2017</a:t>
             </a:fld>
             <a:endParaRPr lang="en-US"/>
           </a:p>
@@ -1484,7 +1492,7 @@
             <a:fld id="{1D8BD707-D9CF-40AE-B4C6-C98DA3205C09}" type="datetimeFigureOut">
               <a:rPr lang="en-US" smtClean="0"/>
               <a:pPr/>
-              <a:t>3/7/2017</a:t>
+              <a:t>4/5/2017</a:t>
             </a:fld>
             <a:endParaRPr lang="en-US"/>
           </a:p>
@@ -1769,7 +1777,7 @@
             <a:fld id="{1D8BD707-D9CF-40AE-B4C6-C98DA3205C09}" type="datetimeFigureOut">
               <a:rPr lang="en-US" smtClean="0"/>
               <a:pPr/>
-              <a:t>3/7/2017</a:t>
+              <a:t>4/5/2017</a:t>
             </a:fld>
             <a:endParaRPr lang="en-US"/>
           </a:p>
@@ -2188,7 +2196,7 @@
             <a:fld id="{1D8BD707-D9CF-40AE-B4C6-C98DA3205C09}" type="datetimeFigureOut">
               <a:rPr lang="en-US" smtClean="0"/>
               <a:pPr/>
-              <a:t>3/7/2017</a:t>
+              <a:t>4/5/2017</a:t>
             </a:fld>
             <a:endParaRPr lang="en-US"/>
           </a:p>
@@ -2303,7 +2311,7 @@
             <a:fld id="{1D8BD707-D9CF-40AE-B4C6-C98DA3205C09}" type="datetimeFigureOut">
               <a:rPr lang="en-US" smtClean="0"/>
               <a:pPr/>
-              <a:t>3/7/2017</a:t>
+              <a:t>4/5/2017</a:t>
             </a:fld>
             <a:endParaRPr lang="en-US"/>
           </a:p>
@@ -2395,7 +2403,7 @@
             <a:fld id="{1D8BD707-D9CF-40AE-B4C6-C98DA3205C09}" type="datetimeFigureOut">
               <a:rPr lang="en-US" smtClean="0"/>
               <a:pPr/>
-              <a:t>3/7/2017</a:t>
+              <a:t>4/5/2017</a:t>
             </a:fld>
             <a:endParaRPr lang="en-US"/>
           </a:p>
@@ -2669,7 +2677,7 @@
             <a:fld id="{1D8BD707-D9CF-40AE-B4C6-C98DA3205C09}" type="datetimeFigureOut">
               <a:rPr lang="en-US" smtClean="0"/>
               <a:pPr/>
-              <a:t>3/7/2017</a:t>
+              <a:t>4/5/2017</a:t>
             </a:fld>
             <a:endParaRPr lang="en-US"/>
           </a:p>
@@ -2919,7 +2927,7 @@
             <a:fld id="{1D8BD707-D9CF-40AE-B4C6-C98DA3205C09}" type="datetimeFigureOut">
               <a:rPr lang="en-US" smtClean="0"/>
               <a:pPr/>
-              <a:t>3/7/2017</a:t>
+              <a:t>4/5/2017</a:t>
             </a:fld>
             <a:endParaRPr lang="en-US"/>
           </a:p>
@@ -3129,7 +3137,7 @@
             <a:fld id="{1D8BD707-D9CF-40AE-B4C6-C98DA3205C09}" type="datetimeFigureOut">
               <a:rPr lang="en-US" smtClean="0"/>
               <a:pPr/>
-              <a:t>3/7/2017</a:t>
+              <a:t>4/5/2017</a:t>
             </a:fld>
             <a:endParaRPr lang="en-US"/>
           </a:p>
@@ -3607,6 +3615,126 @@
 </p:sld>
 </file>
 
+<file path=ppt/slides/slide10.xml><?xml version="1.0" encoding="utf-8"?>
+<p:sld xmlns:a="http://schemas.openxmlformats.org/drawingml/2006/main" xmlns:r="http://schemas.openxmlformats.org/officeDocument/2006/relationships" xmlns:p="http://schemas.openxmlformats.org/presentationml/2006/main">
+  <p:cSld>
+    <p:spTree>
+      <p:nvGrpSpPr>
+        <p:cNvPr id="1" name=""/>
+        <p:cNvGrpSpPr/>
+        <p:nvPr/>
+      </p:nvGrpSpPr>
+      <p:grpSpPr>
+        <a:xfrm>
+          <a:off x="0" y="0"/>
+          <a:ext cx="0" cy="0"/>
+          <a:chOff x="0" y="0"/>
+          <a:chExt cx="0" cy="0"/>
+        </a:xfrm>
+      </p:grpSpPr>
+    </p:spTree>
+    <p:extLst>
+      <p:ext uri="{BB962C8B-B14F-4D97-AF65-F5344CB8AC3E}">
+        <p14:creationId xmlns:p14="http://schemas.microsoft.com/office/powerpoint/2010/main" val="2471747029"/>
+      </p:ext>
+    </p:extLst>
+  </p:cSld>
+  <p:clrMapOvr>
+    <a:masterClrMapping/>
+  </p:clrMapOvr>
+</p:sld>
+</file>
+
+<file path=ppt/slides/slide11.xml><?xml version="1.0" encoding="utf-8"?>
+<p:sld xmlns:a="http://schemas.openxmlformats.org/drawingml/2006/main" xmlns:r="http://schemas.openxmlformats.org/officeDocument/2006/relationships" xmlns:p="http://schemas.openxmlformats.org/presentationml/2006/main">
+  <p:cSld>
+    <p:spTree>
+      <p:nvGrpSpPr>
+        <p:cNvPr id="1" name=""/>
+        <p:cNvGrpSpPr/>
+        <p:nvPr/>
+      </p:nvGrpSpPr>
+      <p:grpSpPr>
+        <a:xfrm>
+          <a:off x="0" y="0"/>
+          <a:ext cx="0" cy="0"/>
+          <a:chOff x="0" y="0"/>
+          <a:chExt cx="0" cy="0"/>
+        </a:xfrm>
+      </p:grpSpPr>
+    </p:spTree>
+    <p:extLst>
+      <p:ext uri="{BB962C8B-B14F-4D97-AF65-F5344CB8AC3E}">
+        <p14:creationId xmlns:p14="http://schemas.microsoft.com/office/powerpoint/2010/main" val="2112322946"/>
+      </p:ext>
+    </p:extLst>
+  </p:cSld>
+  <p:clrMapOvr>
+    <a:masterClrMapping/>
+  </p:clrMapOvr>
+</p:sld>
+</file>
+
+<file path=ppt/slides/slide12.xml><?xml version="1.0" encoding="utf-8"?>
+<p:sld xmlns:a="http://schemas.openxmlformats.org/drawingml/2006/main" xmlns:r="http://schemas.openxmlformats.org/officeDocument/2006/relationships" xmlns:p="http://schemas.openxmlformats.org/presentationml/2006/main">
+  <p:cSld>
+    <p:spTree>
+      <p:nvGrpSpPr>
+        <p:cNvPr id="1" name=""/>
+        <p:cNvGrpSpPr/>
+        <p:nvPr/>
+      </p:nvGrpSpPr>
+      <p:grpSpPr>
+        <a:xfrm>
+          <a:off x="0" y="0"/>
+          <a:ext cx="0" cy="0"/>
+          <a:chOff x="0" y="0"/>
+          <a:chExt cx="0" cy="0"/>
+        </a:xfrm>
+      </p:grpSpPr>
+    </p:spTree>
+    <p:extLst>
+      <p:ext uri="{BB962C8B-B14F-4D97-AF65-F5344CB8AC3E}">
+        <p14:creationId xmlns:p14="http://schemas.microsoft.com/office/powerpoint/2010/main" val="3997160187"/>
+      </p:ext>
+    </p:extLst>
+  </p:cSld>
+  <p:clrMapOvr>
+    <a:masterClrMapping/>
+  </p:clrMapOvr>
+</p:sld>
+</file>
+
+<file path=ppt/slides/slide13.xml><?xml version="1.0" encoding="utf-8"?>
+<p:sld xmlns:a="http://schemas.openxmlformats.org/drawingml/2006/main" xmlns:r="http://schemas.openxmlformats.org/officeDocument/2006/relationships" xmlns:p="http://schemas.openxmlformats.org/presentationml/2006/main">
+  <p:cSld>
+    <p:spTree>
+      <p:nvGrpSpPr>
+        <p:cNvPr id="1" name=""/>
+        <p:cNvGrpSpPr/>
+        <p:nvPr/>
+      </p:nvGrpSpPr>
+      <p:grpSpPr>
+        <a:xfrm>
+          <a:off x="0" y="0"/>
+          <a:ext cx="0" cy="0"/>
+          <a:chOff x="0" y="0"/>
+          <a:chExt cx="0" cy="0"/>
+        </a:xfrm>
+      </p:grpSpPr>
+    </p:spTree>
+    <p:extLst>
+      <p:ext uri="{BB962C8B-B14F-4D97-AF65-F5344CB8AC3E}">
+        <p14:creationId xmlns:p14="http://schemas.microsoft.com/office/powerpoint/2010/main" val="890324897"/>
+      </p:ext>
+    </p:extLst>
+  </p:cSld>
+  <p:clrMapOvr>
+    <a:masterClrMapping/>
+  </p:clrMapOvr>
+</p:sld>
+</file>
+
 <file path=ppt/slides/slide2.xml><?xml version="1.0" encoding="utf-8"?>
 <p:sld xmlns:a="http://schemas.openxmlformats.org/drawingml/2006/main" xmlns:r="http://schemas.openxmlformats.org/officeDocument/2006/relationships" xmlns:p="http://schemas.openxmlformats.org/presentationml/2006/main">
   <p:cSld>
@@ -5028,7 +5156,6 @@
               <a:rPr lang="en-US" sz="1000" dirty="0"/>
               <a:t>5</a:t>
             </a:r>
-            <a:endParaRPr lang="en-US" sz="1000" dirty="0"/>
           </a:p>
         </p:txBody>
       </p:sp>
@@ -5242,6 +5369,70 @@
           <a:chExt cx="0" cy="0"/>
         </a:xfrm>
       </p:grpSpPr>
+      <p:pic>
+        <p:nvPicPr>
+          <p:cNvPr id="1026" name="Picture 2"/>
+          <p:cNvPicPr>
+            <a:picLocks noChangeAspect="1" noChangeArrowheads="1"/>
+          </p:cNvPicPr>
+          <p:nvPr/>
+        </p:nvPicPr>
+        <p:blipFill>
+          <a:blip r:embed="rId2">
+            <a:extLst>
+              <a:ext uri="{28A0092B-C50C-407E-A947-70E740481C1C}">
+                <a14:useLocalDpi xmlns:a14="http://schemas.microsoft.com/office/drawing/2010/main" val="0"/>
+              </a:ext>
+            </a:extLst>
+          </a:blip>
+          <a:srcRect/>
+          <a:stretch>
+            <a:fillRect/>
+          </a:stretch>
+        </p:blipFill>
+        <p:spPr bwMode="auto">
+          <a:xfrm>
+            <a:off x="1323974" y="2590800"/>
+            <a:ext cx="5381625" cy="2700650"/>
+          </a:xfrm>
+          <a:prstGeom prst="rect">
+            <a:avLst/>
+          </a:prstGeom>
+          <a:noFill/>
+          <a:ln>
+            <a:noFill/>
+          </a:ln>
+          <a:effectLst/>
+          <a:extLst>
+            <a:ext uri="{909E8E84-426E-40DD-AFC4-6F175D3DCCD1}">
+              <a14:hiddenFill xmlns:a14="http://schemas.microsoft.com/office/drawing/2010/main">
+                <a:solidFill>
+                  <a:schemeClr val="accent1"/>
+                </a:solidFill>
+              </a14:hiddenFill>
+            </a:ext>
+            <a:ext uri="{91240B29-F687-4F45-9708-019B960494DF}">
+              <a14:hiddenLine xmlns:a14="http://schemas.microsoft.com/office/drawing/2010/main" w="9525">
+                <a:solidFill>
+                  <a:schemeClr val="tx1"/>
+                </a:solidFill>
+                <a:miter lim="800000"/>
+                <a:headEnd/>
+                <a:tailEnd/>
+              </a14:hiddenLine>
+            </a:ext>
+            <a:ext uri="{AF507438-7753-43E0-B8FC-AC1667EBCBE1}">
+              <a14:hiddenEffects xmlns:a14="http://schemas.microsoft.com/office/drawing/2010/main">
+                <a:effectLst>
+                  <a:outerShdw dist="35921" dir="2700000" algn="ctr" rotWithShape="0">
+                    <a:schemeClr val="bg2"/>
+                  </a:outerShdw>
+                </a:effectLst>
+              </a14:hiddenEffects>
+            </a:ext>
+          </a:extLst>
+        </p:spPr>
+      </p:pic>
     </p:spTree>
     <p:extLst>
       <p:ext uri="{BB962C8B-B14F-4D97-AF65-F5344CB8AC3E}">
@@ -5272,10 +5463,419 @@
           <a:chExt cx="0" cy="0"/>
         </a:xfrm>
       </p:grpSpPr>
+      <p:pic>
+        <p:nvPicPr>
+          <p:cNvPr id="2050" name="Picture 2"/>
+          <p:cNvPicPr>
+            <a:picLocks noChangeAspect="1" noChangeArrowheads="1"/>
+          </p:cNvPicPr>
+          <p:nvPr/>
+        </p:nvPicPr>
+        <p:blipFill>
+          <a:blip r:embed="rId2">
+            <a:extLst>
+              <a:ext uri="{28A0092B-C50C-407E-A947-70E740481C1C}">
+                <a14:useLocalDpi xmlns:a14="http://schemas.microsoft.com/office/drawing/2010/main" val="0"/>
+              </a:ext>
+            </a:extLst>
+          </a:blip>
+          <a:srcRect/>
+          <a:stretch>
+            <a:fillRect/>
+          </a:stretch>
+        </p:blipFill>
+        <p:spPr bwMode="auto">
+          <a:xfrm>
+            <a:off x="609600" y="2057400"/>
+            <a:ext cx="5358879" cy="2243137"/>
+          </a:xfrm>
+          <a:prstGeom prst="rect">
+            <a:avLst/>
+          </a:prstGeom>
+          <a:noFill/>
+          <a:ln>
+            <a:noFill/>
+          </a:ln>
+          <a:effectLst/>
+          <a:extLst>
+            <a:ext uri="{909E8E84-426E-40DD-AFC4-6F175D3DCCD1}">
+              <a14:hiddenFill xmlns:a14="http://schemas.microsoft.com/office/drawing/2010/main">
+                <a:solidFill>
+                  <a:schemeClr val="accent1"/>
+                </a:solidFill>
+              </a14:hiddenFill>
+            </a:ext>
+            <a:ext uri="{91240B29-F687-4F45-9708-019B960494DF}">
+              <a14:hiddenLine xmlns:a14="http://schemas.microsoft.com/office/drawing/2010/main" w="9525">
+                <a:solidFill>
+                  <a:schemeClr val="tx1"/>
+                </a:solidFill>
+                <a:miter lim="800000"/>
+                <a:headEnd/>
+                <a:tailEnd/>
+              </a14:hiddenLine>
+            </a:ext>
+            <a:ext uri="{AF507438-7753-43E0-B8FC-AC1667EBCBE1}">
+              <a14:hiddenEffects xmlns:a14="http://schemas.microsoft.com/office/drawing/2010/main">
+                <a:effectLst>
+                  <a:outerShdw dist="35921" dir="2700000" algn="ctr" rotWithShape="0">
+                    <a:schemeClr val="bg2"/>
+                  </a:outerShdw>
+                </a:effectLst>
+              </a14:hiddenEffects>
+            </a:ext>
+          </a:extLst>
+        </p:spPr>
+      </p:pic>
     </p:spTree>
     <p:extLst>
       <p:ext uri="{BB962C8B-B14F-4D97-AF65-F5344CB8AC3E}">
         <p14:creationId xmlns:p14="http://schemas.microsoft.com/office/powerpoint/2010/main" val="1467764718"/>
+      </p:ext>
+    </p:extLst>
+  </p:cSld>
+  <p:clrMapOvr>
+    <a:masterClrMapping/>
+  </p:clrMapOvr>
+</p:sld>
+</file>
+
+<file path=ppt/slides/slide6.xml><?xml version="1.0" encoding="utf-8"?>
+<p:sld xmlns:a="http://schemas.openxmlformats.org/drawingml/2006/main" xmlns:r="http://schemas.openxmlformats.org/officeDocument/2006/relationships" xmlns:p="http://schemas.openxmlformats.org/presentationml/2006/main">
+  <p:cSld>
+    <p:spTree>
+      <p:nvGrpSpPr>
+        <p:cNvPr id="1" name=""/>
+        <p:cNvGrpSpPr/>
+        <p:nvPr/>
+      </p:nvGrpSpPr>
+      <p:grpSpPr>
+        <a:xfrm>
+          <a:off x="0" y="0"/>
+          <a:ext cx="0" cy="0"/>
+          <a:chOff x="0" y="0"/>
+          <a:chExt cx="0" cy="0"/>
+        </a:xfrm>
+      </p:grpSpPr>
+      <p:pic>
+        <p:nvPicPr>
+          <p:cNvPr id="3074" name="Picture 2"/>
+          <p:cNvPicPr>
+            <a:picLocks noChangeAspect="1" noChangeArrowheads="1"/>
+          </p:cNvPicPr>
+          <p:nvPr/>
+        </p:nvPicPr>
+        <p:blipFill>
+          <a:blip r:embed="rId2">
+            <a:extLst>
+              <a:ext uri="{28A0092B-C50C-407E-A947-70E740481C1C}">
+                <a14:useLocalDpi xmlns:a14="http://schemas.microsoft.com/office/drawing/2010/main" val="0"/>
+              </a:ext>
+            </a:extLst>
+          </a:blip>
+          <a:srcRect/>
+          <a:stretch>
+            <a:fillRect/>
+          </a:stretch>
+        </p:blipFill>
+        <p:spPr bwMode="auto">
+          <a:xfrm>
+            <a:off x="4267200" y="1295400"/>
+            <a:ext cx="2981079" cy="2657475"/>
+          </a:xfrm>
+          <a:prstGeom prst="rect">
+            <a:avLst/>
+          </a:prstGeom>
+          <a:noFill/>
+          <a:ln>
+            <a:noFill/>
+          </a:ln>
+          <a:effectLst/>
+          <a:extLst>
+            <a:ext uri="{909E8E84-426E-40DD-AFC4-6F175D3DCCD1}">
+              <a14:hiddenFill xmlns:a14="http://schemas.microsoft.com/office/drawing/2010/main">
+                <a:solidFill>
+                  <a:schemeClr val="accent1"/>
+                </a:solidFill>
+              </a14:hiddenFill>
+            </a:ext>
+            <a:ext uri="{91240B29-F687-4F45-9708-019B960494DF}">
+              <a14:hiddenLine xmlns:a14="http://schemas.microsoft.com/office/drawing/2010/main" w="9525">
+                <a:solidFill>
+                  <a:schemeClr val="tx1"/>
+                </a:solidFill>
+                <a:miter lim="800000"/>
+                <a:headEnd/>
+                <a:tailEnd/>
+              </a14:hiddenLine>
+            </a:ext>
+            <a:ext uri="{AF507438-7753-43E0-B8FC-AC1667EBCBE1}">
+              <a14:hiddenEffects xmlns:a14="http://schemas.microsoft.com/office/drawing/2010/main">
+                <a:effectLst>
+                  <a:outerShdw dist="35921" dir="2700000" algn="ctr" rotWithShape="0">
+                    <a:schemeClr val="bg2"/>
+                  </a:outerShdw>
+                </a:effectLst>
+              </a14:hiddenEffects>
+            </a:ext>
+          </a:extLst>
+        </p:spPr>
+      </p:pic>
+      <p:pic>
+        <p:nvPicPr>
+          <p:cNvPr id="3" name="Picture 2"/>
+          <p:cNvPicPr/>
+          <p:nvPr/>
+        </p:nvPicPr>
+        <p:blipFill>
+          <a:blip r:embed="rId3">
+            <a:extLst>
+              <a:ext uri="{28A0092B-C50C-407E-A947-70E740481C1C}">
+                <a14:useLocalDpi xmlns:a14="http://schemas.microsoft.com/office/drawing/2010/main" val="0"/>
+              </a:ext>
+            </a:extLst>
+          </a:blip>
+          <a:srcRect/>
+          <a:stretch>
+            <a:fillRect/>
+          </a:stretch>
+        </p:blipFill>
+        <p:spPr bwMode="auto">
+          <a:xfrm>
+            <a:off x="1752600" y="2895600"/>
+            <a:ext cx="4592955" cy="2339340"/>
+          </a:xfrm>
+          <a:prstGeom prst="rect">
+            <a:avLst/>
+          </a:prstGeom>
+          <a:noFill/>
+          <a:ln>
+            <a:noFill/>
+          </a:ln>
+        </p:spPr>
+      </p:pic>
+    </p:spTree>
+    <p:extLst>
+      <p:ext uri="{BB962C8B-B14F-4D97-AF65-F5344CB8AC3E}">
+        <p14:creationId xmlns:p14="http://schemas.microsoft.com/office/powerpoint/2010/main" val="2863671262"/>
+      </p:ext>
+    </p:extLst>
+  </p:cSld>
+  <p:clrMapOvr>
+    <a:masterClrMapping/>
+  </p:clrMapOvr>
+</p:sld>
+</file>
+
+<file path=ppt/slides/slide7.xml><?xml version="1.0" encoding="utf-8"?>
+<p:sld xmlns:a="http://schemas.openxmlformats.org/drawingml/2006/main" xmlns:r="http://schemas.openxmlformats.org/officeDocument/2006/relationships" xmlns:p="http://schemas.openxmlformats.org/presentationml/2006/main">
+  <p:cSld>
+    <p:spTree>
+      <p:nvGrpSpPr>
+        <p:cNvPr id="1" name=""/>
+        <p:cNvGrpSpPr/>
+        <p:nvPr/>
+      </p:nvGrpSpPr>
+      <p:grpSpPr>
+        <a:xfrm>
+          <a:off x="0" y="0"/>
+          <a:ext cx="0" cy="0"/>
+          <a:chOff x="0" y="0"/>
+          <a:chExt cx="0" cy="0"/>
+        </a:xfrm>
+      </p:grpSpPr>
+      <p:pic>
+        <p:nvPicPr>
+          <p:cNvPr id="4098" name="Picture 2"/>
+          <p:cNvPicPr>
+            <a:picLocks noChangeAspect="1" noChangeArrowheads="1"/>
+          </p:cNvPicPr>
+          <p:nvPr/>
+        </p:nvPicPr>
+        <p:blipFill>
+          <a:blip r:embed="rId2">
+            <a:extLst>
+              <a:ext uri="{28A0092B-C50C-407E-A947-70E740481C1C}">
+                <a14:useLocalDpi xmlns:a14="http://schemas.microsoft.com/office/drawing/2010/main" val="0"/>
+              </a:ext>
+            </a:extLst>
+          </a:blip>
+          <a:srcRect/>
+          <a:stretch>
+            <a:fillRect/>
+          </a:stretch>
+        </p:blipFill>
+        <p:spPr bwMode="auto">
+          <a:xfrm>
+            <a:off x="0" y="0"/>
+            <a:ext cx="13011150" cy="7029450"/>
+          </a:xfrm>
+          <a:prstGeom prst="rect">
+            <a:avLst/>
+          </a:prstGeom>
+          <a:noFill/>
+          <a:ln>
+            <a:noFill/>
+          </a:ln>
+          <a:effectLst/>
+          <a:extLst>
+            <a:ext uri="{909E8E84-426E-40DD-AFC4-6F175D3DCCD1}">
+              <a14:hiddenFill xmlns:a14="http://schemas.microsoft.com/office/drawing/2010/main">
+                <a:solidFill>
+                  <a:schemeClr val="accent1"/>
+                </a:solidFill>
+              </a14:hiddenFill>
+            </a:ext>
+            <a:ext uri="{91240B29-F687-4F45-9708-019B960494DF}">
+              <a14:hiddenLine xmlns:a14="http://schemas.microsoft.com/office/drawing/2010/main" w="9525">
+                <a:solidFill>
+                  <a:schemeClr val="tx1"/>
+                </a:solidFill>
+                <a:miter lim="800000"/>
+                <a:headEnd/>
+                <a:tailEnd/>
+              </a14:hiddenLine>
+            </a:ext>
+            <a:ext uri="{AF507438-7753-43E0-B8FC-AC1667EBCBE1}">
+              <a14:hiddenEffects xmlns:a14="http://schemas.microsoft.com/office/drawing/2010/main">
+                <a:effectLst>
+                  <a:outerShdw dist="35921" dir="2700000" algn="ctr" rotWithShape="0">
+                    <a:schemeClr val="bg2"/>
+                  </a:outerShdw>
+                </a:effectLst>
+              </a14:hiddenEffects>
+            </a:ext>
+          </a:extLst>
+        </p:spPr>
+      </p:pic>
+    </p:spTree>
+    <p:extLst>
+      <p:ext uri="{BB962C8B-B14F-4D97-AF65-F5344CB8AC3E}">
+        <p14:creationId xmlns:p14="http://schemas.microsoft.com/office/powerpoint/2010/main" val="169799899"/>
+      </p:ext>
+    </p:extLst>
+  </p:cSld>
+  <p:clrMapOvr>
+    <a:masterClrMapping/>
+  </p:clrMapOvr>
+</p:sld>
+</file>
+
+<file path=ppt/slides/slide8.xml><?xml version="1.0" encoding="utf-8"?>
+<p:sld xmlns:a="http://schemas.openxmlformats.org/drawingml/2006/main" xmlns:r="http://schemas.openxmlformats.org/officeDocument/2006/relationships" xmlns:p="http://schemas.openxmlformats.org/presentationml/2006/main">
+  <p:cSld>
+    <p:spTree>
+      <p:nvGrpSpPr>
+        <p:cNvPr id="1" name=""/>
+        <p:cNvGrpSpPr/>
+        <p:nvPr/>
+      </p:nvGrpSpPr>
+      <p:grpSpPr>
+        <a:xfrm>
+          <a:off x="0" y="0"/>
+          <a:ext cx="0" cy="0"/>
+          <a:chOff x="0" y="0"/>
+          <a:chExt cx="0" cy="0"/>
+        </a:xfrm>
+      </p:grpSpPr>
+      <p:pic>
+        <p:nvPicPr>
+          <p:cNvPr id="5122" name="Picture 2"/>
+          <p:cNvPicPr>
+            <a:picLocks noChangeAspect="1" noChangeArrowheads="1"/>
+          </p:cNvPicPr>
+          <p:nvPr/>
+        </p:nvPicPr>
+        <p:blipFill>
+          <a:blip r:embed="rId2">
+            <a:extLst>
+              <a:ext uri="{28A0092B-C50C-407E-A947-70E740481C1C}">
+                <a14:useLocalDpi xmlns:a14="http://schemas.microsoft.com/office/drawing/2010/main" val="0"/>
+              </a:ext>
+            </a:extLst>
+          </a:blip>
+          <a:srcRect/>
+          <a:stretch>
+            <a:fillRect/>
+          </a:stretch>
+        </p:blipFill>
+        <p:spPr bwMode="auto">
+          <a:xfrm>
+            <a:off x="0" y="981075"/>
+            <a:ext cx="10401300" cy="4895850"/>
+          </a:xfrm>
+          <a:prstGeom prst="rect">
+            <a:avLst/>
+          </a:prstGeom>
+          <a:noFill/>
+          <a:ln>
+            <a:noFill/>
+          </a:ln>
+          <a:effectLst/>
+          <a:extLst>
+            <a:ext uri="{909E8E84-426E-40DD-AFC4-6F175D3DCCD1}">
+              <a14:hiddenFill xmlns:a14="http://schemas.microsoft.com/office/drawing/2010/main">
+                <a:solidFill>
+                  <a:schemeClr val="accent1"/>
+                </a:solidFill>
+              </a14:hiddenFill>
+            </a:ext>
+            <a:ext uri="{91240B29-F687-4F45-9708-019B960494DF}">
+              <a14:hiddenLine xmlns:a14="http://schemas.microsoft.com/office/drawing/2010/main" w="9525">
+                <a:solidFill>
+                  <a:schemeClr val="tx1"/>
+                </a:solidFill>
+                <a:miter lim="800000"/>
+                <a:headEnd/>
+                <a:tailEnd/>
+              </a14:hiddenLine>
+            </a:ext>
+            <a:ext uri="{AF507438-7753-43E0-B8FC-AC1667EBCBE1}">
+              <a14:hiddenEffects xmlns:a14="http://schemas.microsoft.com/office/drawing/2010/main">
+                <a:effectLst>
+                  <a:outerShdw dist="35921" dir="2700000" algn="ctr" rotWithShape="0">
+                    <a:schemeClr val="bg2"/>
+                  </a:outerShdw>
+                </a:effectLst>
+              </a14:hiddenEffects>
+            </a:ext>
+          </a:extLst>
+        </p:spPr>
+      </p:pic>
+    </p:spTree>
+    <p:extLst>
+      <p:ext uri="{BB962C8B-B14F-4D97-AF65-F5344CB8AC3E}">
+        <p14:creationId xmlns:p14="http://schemas.microsoft.com/office/powerpoint/2010/main" val="1731638570"/>
+      </p:ext>
+    </p:extLst>
+  </p:cSld>
+  <p:clrMapOvr>
+    <a:masterClrMapping/>
+  </p:clrMapOvr>
+</p:sld>
+</file>
+
+<file path=ppt/slides/slide9.xml><?xml version="1.0" encoding="utf-8"?>
+<p:sld xmlns:a="http://schemas.openxmlformats.org/drawingml/2006/main" xmlns:r="http://schemas.openxmlformats.org/officeDocument/2006/relationships" xmlns:p="http://schemas.openxmlformats.org/presentationml/2006/main">
+  <p:cSld>
+    <p:spTree>
+      <p:nvGrpSpPr>
+        <p:cNvPr id="1" name=""/>
+        <p:cNvGrpSpPr/>
+        <p:nvPr/>
+      </p:nvGrpSpPr>
+      <p:grpSpPr>
+        <a:xfrm>
+          <a:off x="0" y="0"/>
+          <a:ext cx="0" cy="0"/>
+          <a:chOff x="0" y="0"/>
+          <a:chExt cx="0" cy="0"/>
+        </a:xfrm>
+      </p:grpSpPr>
+    </p:spTree>
+    <p:extLst>
+      <p:ext uri="{BB962C8B-B14F-4D97-AF65-F5344CB8AC3E}">
+        <p14:creationId xmlns:p14="http://schemas.microsoft.com/office/powerpoint/2010/main" val="1681687871"/>
       </p:ext>
     </p:extLst>
   </p:cSld>

</xml_diff>

<commit_message>
Insitute Findings, Publish related changes
</commit_message>
<xml_diff>
--- a/Documents/Technical/Help/UserManual/New Microsoft PowerPoint Presentation.pptx
+++ b/Documents/Technical/Help/UserManual/New Microsoft PowerPoint Presentation.pptx
@@ -204,7 +204,7 @@
           <a:p>
             <a:fld id="{2685F925-F09D-4542-A91E-18699BAAF622}" type="datetimeFigureOut">
               <a:rPr lang="en-US" smtClean="0"/>
-              <a:t>4/19/2017</a:t>
+              <a:t>5/14/2017</a:t>
             </a:fld>
             <a:endParaRPr lang="en-US"/>
           </a:p>
@@ -738,7 +738,7 @@
             <a:fld id="{1D8BD707-D9CF-40AE-B4C6-C98DA3205C09}" type="datetimeFigureOut">
               <a:rPr lang="en-US" smtClean="0"/>
               <a:pPr/>
-              <a:t>4/19/2017</a:t>
+              <a:t>5/14/2017</a:t>
             </a:fld>
             <a:endParaRPr lang="en-US"/>
           </a:p>
@@ -905,7 +905,7 @@
             <a:fld id="{1D8BD707-D9CF-40AE-B4C6-C98DA3205C09}" type="datetimeFigureOut">
               <a:rPr lang="en-US" smtClean="0"/>
               <a:pPr/>
-              <a:t>4/19/2017</a:t>
+              <a:t>5/14/2017</a:t>
             </a:fld>
             <a:endParaRPr lang="en-US"/>
           </a:p>
@@ -1082,7 +1082,7 @@
             <a:fld id="{1D8BD707-D9CF-40AE-B4C6-C98DA3205C09}" type="datetimeFigureOut">
               <a:rPr lang="en-US" smtClean="0"/>
               <a:pPr/>
-              <a:t>4/19/2017</a:t>
+              <a:t>5/14/2017</a:t>
             </a:fld>
             <a:endParaRPr lang="en-US"/>
           </a:p>
@@ -1249,7 +1249,7 @@
             <a:fld id="{1D8BD707-D9CF-40AE-B4C6-C98DA3205C09}" type="datetimeFigureOut">
               <a:rPr lang="en-US" smtClean="0"/>
               <a:pPr/>
-              <a:t>4/19/2017</a:t>
+              <a:t>5/14/2017</a:t>
             </a:fld>
             <a:endParaRPr lang="en-US"/>
           </a:p>
@@ -1492,7 +1492,7 @@
             <a:fld id="{1D8BD707-D9CF-40AE-B4C6-C98DA3205C09}" type="datetimeFigureOut">
               <a:rPr lang="en-US" smtClean="0"/>
               <a:pPr/>
-              <a:t>4/19/2017</a:t>
+              <a:t>5/14/2017</a:t>
             </a:fld>
             <a:endParaRPr lang="en-US"/>
           </a:p>
@@ -1777,7 +1777,7 @@
             <a:fld id="{1D8BD707-D9CF-40AE-B4C6-C98DA3205C09}" type="datetimeFigureOut">
               <a:rPr lang="en-US" smtClean="0"/>
               <a:pPr/>
-              <a:t>4/19/2017</a:t>
+              <a:t>5/14/2017</a:t>
             </a:fld>
             <a:endParaRPr lang="en-US"/>
           </a:p>
@@ -2196,7 +2196,7 @@
             <a:fld id="{1D8BD707-D9CF-40AE-B4C6-C98DA3205C09}" type="datetimeFigureOut">
               <a:rPr lang="en-US" smtClean="0"/>
               <a:pPr/>
-              <a:t>4/19/2017</a:t>
+              <a:t>5/14/2017</a:t>
             </a:fld>
             <a:endParaRPr lang="en-US"/>
           </a:p>
@@ -2311,7 +2311,7 @@
             <a:fld id="{1D8BD707-D9CF-40AE-B4C6-C98DA3205C09}" type="datetimeFigureOut">
               <a:rPr lang="en-US" smtClean="0"/>
               <a:pPr/>
-              <a:t>4/19/2017</a:t>
+              <a:t>5/14/2017</a:t>
             </a:fld>
             <a:endParaRPr lang="en-US"/>
           </a:p>
@@ -2403,7 +2403,7 @@
             <a:fld id="{1D8BD707-D9CF-40AE-B4C6-C98DA3205C09}" type="datetimeFigureOut">
               <a:rPr lang="en-US" smtClean="0"/>
               <a:pPr/>
-              <a:t>4/19/2017</a:t>
+              <a:t>5/14/2017</a:t>
             </a:fld>
             <a:endParaRPr lang="en-US"/>
           </a:p>
@@ -2677,7 +2677,7 @@
             <a:fld id="{1D8BD707-D9CF-40AE-B4C6-C98DA3205C09}" type="datetimeFigureOut">
               <a:rPr lang="en-US" smtClean="0"/>
               <a:pPr/>
-              <a:t>4/19/2017</a:t>
+              <a:t>5/14/2017</a:t>
             </a:fld>
             <a:endParaRPr lang="en-US"/>
           </a:p>
@@ -2927,7 +2927,7 @@
             <a:fld id="{1D8BD707-D9CF-40AE-B4C6-C98DA3205C09}" type="datetimeFigureOut">
               <a:rPr lang="en-US" smtClean="0"/>
               <a:pPr/>
-              <a:t>4/19/2017</a:t>
+              <a:t>5/14/2017</a:t>
             </a:fld>
             <a:endParaRPr lang="en-US"/>
           </a:p>
@@ -3137,7 +3137,7 @@
             <a:fld id="{1D8BD707-D9CF-40AE-B4C6-C98DA3205C09}" type="datetimeFigureOut">
               <a:rPr lang="en-US" smtClean="0"/>
               <a:pPr/>
-              <a:t>4/19/2017</a:t>
+              <a:t>5/14/2017</a:t>
             </a:fld>
             <a:endParaRPr lang="en-US"/>
           </a:p>
@@ -3632,6 +3632,353 @@
           <a:chExt cx="0" cy="0"/>
         </a:xfrm>
       </p:grpSpPr>
+      <p:pic>
+        <p:nvPicPr>
+          <p:cNvPr id="1028" name="Picture 4"/>
+          <p:cNvPicPr>
+            <a:picLocks noChangeAspect="1" noChangeArrowheads="1"/>
+          </p:cNvPicPr>
+          <p:nvPr/>
+        </p:nvPicPr>
+        <p:blipFill>
+          <a:blip r:embed="rId2">
+            <a:extLst>
+              <a:ext uri="{28A0092B-C50C-407E-A947-70E740481C1C}">
+                <a14:useLocalDpi xmlns:a14="http://schemas.microsoft.com/office/drawing/2010/main" val="0"/>
+              </a:ext>
+            </a:extLst>
+          </a:blip>
+          <a:srcRect/>
+          <a:stretch>
+            <a:fillRect/>
+          </a:stretch>
+        </p:blipFill>
+        <p:spPr bwMode="auto">
+          <a:xfrm>
+            <a:off x="1357313" y="1357313"/>
+            <a:ext cx="4352925" cy="3609975"/>
+          </a:xfrm>
+          <a:prstGeom prst="rect">
+            <a:avLst/>
+          </a:prstGeom>
+          <a:noFill/>
+          <a:ln w="9525">
+            <a:solidFill>
+              <a:schemeClr val="tx1"/>
+            </a:solidFill>
+            <a:miter lim="800000"/>
+            <a:headEnd/>
+            <a:tailEnd/>
+          </a:ln>
+          <a:effectLst/>
+          <a:extLst>
+            <a:ext uri="{909E8E84-426E-40DD-AFC4-6F175D3DCCD1}">
+              <a14:hiddenFill xmlns:a14="http://schemas.microsoft.com/office/drawing/2010/main">
+                <a:solidFill>
+                  <a:schemeClr val="accent1"/>
+                </a:solidFill>
+              </a14:hiddenFill>
+            </a:ext>
+            <a:ext uri="{AF507438-7753-43E0-B8FC-AC1667EBCBE1}">
+              <a14:hiddenEffects xmlns:a14="http://schemas.microsoft.com/office/drawing/2010/main">
+                <a:effectLst>
+                  <a:outerShdw dist="35921" dir="2700000" algn="ctr" rotWithShape="0">
+                    <a:schemeClr val="bg2"/>
+                  </a:outerShdw>
+                </a:effectLst>
+              </a14:hiddenEffects>
+            </a:ext>
+          </a:extLst>
+        </p:spPr>
+      </p:pic>
+      <p:cxnSp>
+        <p:nvCxnSpPr>
+          <p:cNvPr id="8" name="Straight Connector 7"/>
+          <p:cNvCxnSpPr/>
+          <p:nvPr/>
+        </p:nvCxnSpPr>
+        <p:spPr>
+          <a:xfrm flipH="1">
+            <a:off x="5638800" y="3305175"/>
+            <a:ext cx="400050" cy="161925"/>
+          </a:xfrm>
+          <a:prstGeom prst="line">
+            <a:avLst/>
+          </a:prstGeom>
+          <a:ln w="19050">
+            <a:solidFill>
+              <a:srgbClr val="FF0000"/>
+            </a:solidFill>
+            <a:tailEnd type="oval"/>
+          </a:ln>
+        </p:spPr>
+        <p:style>
+          <a:lnRef idx="1">
+            <a:schemeClr val="accent1"/>
+          </a:lnRef>
+          <a:fillRef idx="0">
+            <a:schemeClr val="accent1"/>
+          </a:fillRef>
+          <a:effectRef idx="0">
+            <a:schemeClr val="accent1"/>
+          </a:effectRef>
+          <a:fontRef idx="minor">
+            <a:schemeClr val="tx1"/>
+          </a:fontRef>
+        </p:style>
+      </p:cxnSp>
+      <p:sp>
+        <p:nvSpPr>
+          <p:cNvPr id="10" name="TextBox 9"/>
+          <p:cNvSpPr txBox="1"/>
+          <p:nvPr/>
+        </p:nvSpPr>
+        <p:spPr>
+          <a:xfrm>
+            <a:off x="6038850" y="3182064"/>
+            <a:ext cx="200024" cy="246221"/>
+          </a:xfrm>
+          <a:prstGeom prst="rect">
+            <a:avLst/>
+          </a:prstGeom>
+          <a:noFill/>
+          <a:ln w="19050">
+            <a:solidFill>
+              <a:srgbClr val="FF0000"/>
+            </a:solidFill>
+          </a:ln>
+        </p:spPr>
+        <p:txBody>
+          <a:bodyPr wrap="square" rtlCol="0">
+            <a:spAutoFit/>
+          </a:bodyPr>
+          <a:lstStyle/>
+          <a:p>
+            <a:pPr algn="ctr"/>
+            <a:r>
+              <a:rPr lang="en-US" sz="1000" dirty="0"/>
+              <a:t>2</a:t>
+            </a:r>
+            <a:endParaRPr lang="en-US" sz="1000" dirty="0"/>
+          </a:p>
+        </p:txBody>
+      </p:sp>
+      <p:cxnSp>
+        <p:nvCxnSpPr>
+          <p:cNvPr id="15" name="Straight Connector 14"/>
+          <p:cNvCxnSpPr/>
+          <p:nvPr/>
+        </p:nvCxnSpPr>
+        <p:spPr>
+          <a:xfrm flipH="1">
+            <a:off x="5591175" y="4019550"/>
+            <a:ext cx="400050" cy="161925"/>
+          </a:xfrm>
+          <a:prstGeom prst="line">
+            <a:avLst/>
+          </a:prstGeom>
+          <a:ln w="19050">
+            <a:solidFill>
+              <a:srgbClr val="FF0000"/>
+            </a:solidFill>
+            <a:tailEnd type="oval"/>
+          </a:ln>
+        </p:spPr>
+        <p:style>
+          <a:lnRef idx="1">
+            <a:schemeClr val="accent1"/>
+          </a:lnRef>
+          <a:fillRef idx="0">
+            <a:schemeClr val="accent1"/>
+          </a:fillRef>
+          <a:effectRef idx="0">
+            <a:schemeClr val="accent1"/>
+          </a:effectRef>
+          <a:fontRef idx="minor">
+            <a:schemeClr val="tx1"/>
+          </a:fontRef>
+        </p:style>
+      </p:cxnSp>
+      <p:sp>
+        <p:nvSpPr>
+          <p:cNvPr id="16" name="TextBox 15"/>
+          <p:cNvSpPr txBox="1"/>
+          <p:nvPr/>
+        </p:nvSpPr>
+        <p:spPr>
+          <a:xfrm>
+            <a:off x="5991225" y="3896439"/>
+            <a:ext cx="200024" cy="246221"/>
+          </a:xfrm>
+          <a:prstGeom prst="rect">
+            <a:avLst/>
+          </a:prstGeom>
+          <a:noFill/>
+          <a:ln w="19050">
+            <a:solidFill>
+              <a:srgbClr val="FF0000"/>
+            </a:solidFill>
+          </a:ln>
+        </p:spPr>
+        <p:txBody>
+          <a:bodyPr wrap="square" rtlCol="0">
+            <a:spAutoFit/>
+          </a:bodyPr>
+          <a:lstStyle/>
+          <a:p>
+            <a:pPr algn="ctr"/>
+            <a:r>
+              <a:rPr lang="en-US" sz="1000" dirty="0"/>
+              <a:t>3</a:t>
+            </a:r>
+            <a:endParaRPr lang="en-US" sz="1000" dirty="0"/>
+          </a:p>
+        </p:txBody>
+      </p:sp>
+      <p:cxnSp>
+        <p:nvCxnSpPr>
+          <p:cNvPr id="17" name="Straight Connector 16"/>
+          <p:cNvCxnSpPr/>
+          <p:nvPr/>
+        </p:nvCxnSpPr>
+        <p:spPr>
+          <a:xfrm>
+            <a:off x="1147763" y="4271961"/>
+            <a:ext cx="347662" cy="280989"/>
+          </a:xfrm>
+          <a:prstGeom prst="line">
+            <a:avLst/>
+          </a:prstGeom>
+          <a:ln w="19050">
+            <a:solidFill>
+              <a:srgbClr val="FF0000"/>
+            </a:solidFill>
+            <a:tailEnd type="oval"/>
+          </a:ln>
+        </p:spPr>
+        <p:style>
+          <a:lnRef idx="1">
+            <a:schemeClr val="accent1"/>
+          </a:lnRef>
+          <a:fillRef idx="0">
+            <a:schemeClr val="accent1"/>
+          </a:fillRef>
+          <a:effectRef idx="0">
+            <a:schemeClr val="accent1"/>
+          </a:effectRef>
+          <a:fontRef idx="minor">
+            <a:schemeClr val="tx1"/>
+          </a:fontRef>
+        </p:style>
+      </p:cxnSp>
+      <p:sp>
+        <p:nvSpPr>
+          <p:cNvPr id="18" name="TextBox 17"/>
+          <p:cNvSpPr txBox="1"/>
+          <p:nvPr/>
+        </p:nvSpPr>
+        <p:spPr>
+          <a:xfrm>
+            <a:off x="947739" y="4142660"/>
+            <a:ext cx="200024" cy="246221"/>
+          </a:xfrm>
+          <a:prstGeom prst="rect">
+            <a:avLst/>
+          </a:prstGeom>
+          <a:noFill/>
+          <a:ln w="19050">
+            <a:solidFill>
+              <a:srgbClr val="FF0000"/>
+            </a:solidFill>
+          </a:ln>
+        </p:spPr>
+        <p:txBody>
+          <a:bodyPr wrap="square" rtlCol="0">
+            <a:spAutoFit/>
+          </a:bodyPr>
+          <a:lstStyle/>
+          <a:p>
+            <a:pPr algn="ctr"/>
+            <a:r>
+              <a:rPr lang="en-US" sz="1000" dirty="0"/>
+              <a:t>4</a:t>
+            </a:r>
+            <a:endParaRPr lang="en-US" sz="1000" dirty="0"/>
+          </a:p>
+        </p:txBody>
+      </p:sp>
+      <p:cxnSp>
+        <p:nvCxnSpPr>
+          <p:cNvPr id="20" name="Straight Connector 19"/>
+          <p:cNvCxnSpPr/>
+          <p:nvPr/>
+        </p:nvCxnSpPr>
+        <p:spPr>
+          <a:xfrm flipH="1">
+            <a:off x="5638800" y="2085975"/>
+            <a:ext cx="400050" cy="161925"/>
+          </a:xfrm>
+          <a:prstGeom prst="line">
+            <a:avLst/>
+          </a:prstGeom>
+          <a:ln w="19050">
+            <a:solidFill>
+              <a:srgbClr val="FF0000"/>
+            </a:solidFill>
+            <a:tailEnd type="oval"/>
+          </a:ln>
+        </p:spPr>
+        <p:style>
+          <a:lnRef idx="1">
+            <a:schemeClr val="accent1"/>
+          </a:lnRef>
+          <a:fillRef idx="0">
+            <a:schemeClr val="accent1"/>
+          </a:fillRef>
+          <a:effectRef idx="0">
+            <a:schemeClr val="accent1"/>
+          </a:effectRef>
+          <a:fontRef idx="minor">
+            <a:schemeClr val="tx1"/>
+          </a:fontRef>
+        </p:style>
+      </p:cxnSp>
+      <p:sp>
+        <p:nvSpPr>
+          <p:cNvPr id="21" name="TextBox 20"/>
+          <p:cNvSpPr txBox="1"/>
+          <p:nvPr/>
+        </p:nvSpPr>
+        <p:spPr>
+          <a:xfrm>
+            <a:off x="6038850" y="1962864"/>
+            <a:ext cx="200024" cy="246221"/>
+          </a:xfrm>
+          <a:prstGeom prst="rect">
+            <a:avLst/>
+          </a:prstGeom>
+          <a:noFill/>
+          <a:ln w="19050">
+            <a:solidFill>
+              <a:srgbClr val="FF0000"/>
+            </a:solidFill>
+          </a:ln>
+        </p:spPr>
+        <p:txBody>
+          <a:bodyPr wrap="square" rtlCol="0">
+            <a:spAutoFit/>
+          </a:bodyPr>
+          <a:lstStyle/>
+          <a:p>
+            <a:pPr algn="ctr"/>
+            <a:r>
+              <a:rPr lang="en-US" sz="1000" dirty="0" smtClean="0"/>
+              <a:t>1</a:t>
+            </a:r>
+            <a:endParaRPr lang="en-US" sz="1000" dirty="0"/>
+          </a:p>
+        </p:txBody>
+      </p:sp>
     </p:spTree>
     <p:extLst>
       <p:ext uri="{BB962C8B-B14F-4D97-AF65-F5344CB8AC3E}">
@@ -3662,6 +4009,70 @@
           <a:chExt cx="0" cy="0"/>
         </a:xfrm>
       </p:grpSpPr>
+      <p:pic>
+        <p:nvPicPr>
+          <p:cNvPr id="2050" name="Picture 2"/>
+          <p:cNvPicPr>
+            <a:picLocks noChangeAspect="1" noChangeArrowheads="1"/>
+          </p:cNvPicPr>
+          <p:nvPr/>
+        </p:nvPicPr>
+        <p:blipFill>
+          <a:blip r:embed="rId2">
+            <a:extLst>
+              <a:ext uri="{28A0092B-C50C-407E-A947-70E740481C1C}">
+                <a14:useLocalDpi xmlns:a14="http://schemas.microsoft.com/office/drawing/2010/main" val="0"/>
+              </a:ext>
+            </a:extLst>
+          </a:blip>
+          <a:srcRect/>
+          <a:stretch>
+            <a:fillRect/>
+          </a:stretch>
+        </p:blipFill>
+        <p:spPr bwMode="auto">
+          <a:xfrm>
+            <a:off x="647701" y="1414463"/>
+            <a:ext cx="4419599" cy="1880589"/>
+          </a:xfrm>
+          <a:prstGeom prst="rect">
+            <a:avLst/>
+          </a:prstGeom>
+          <a:noFill/>
+          <a:ln>
+            <a:noFill/>
+          </a:ln>
+          <a:effectLst/>
+          <a:extLst>
+            <a:ext uri="{909E8E84-426E-40DD-AFC4-6F175D3DCCD1}">
+              <a14:hiddenFill xmlns:a14="http://schemas.microsoft.com/office/drawing/2010/main">
+                <a:solidFill>
+                  <a:schemeClr val="accent1"/>
+                </a:solidFill>
+              </a14:hiddenFill>
+            </a:ext>
+            <a:ext uri="{91240B29-F687-4F45-9708-019B960494DF}">
+              <a14:hiddenLine xmlns:a14="http://schemas.microsoft.com/office/drawing/2010/main" w="9525">
+                <a:solidFill>
+                  <a:schemeClr val="tx1"/>
+                </a:solidFill>
+                <a:miter lim="800000"/>
+                <a:headEnd/>
+                <a:tailEnd/>
+              </a14:hiddenLine>
+            </a:ext>
+            <a:ext uri="{AF507438-7753-43E0-B8FC-AC1667EBCBE1}">
+              <a14:hiddenEffects xmlns:a14="http://schemas.microsoft.com/office/drawing/2010/main">
+                <a:effectLst>
+                  <a:outerShdw dist="35921" dir="2700000" algn="ctr" rotWithShape="0">
+                    <a:schemeClr val="bg2"/>
+                  </a:outerShdw>
+                </a:effectLst>
+              </a14:hiddenEffects>
+            </a:ext>
+          </a:extLst>
+        </p:spPr>
+      </p:pic>
     </p:spTree>
     <p:extLst>
       <p:ext uri="{BB962C8B-B14F-4D97-AF65-F5344CB8AC3E}">
@@ -3692,6 +4103,134 @@
           <a:chExt cx="0" cy="0"/>
         </a:xfrm>
       </p:grpSpPr>
+      <p:pic>
+        <p:nvPicPr>
+          <p:cNvPr id="3074" name="Picture 2"/>
+          <p:cNvPicPr>
+            <a:picLocks noChangeAspect="1" noChangeArrowheads="1"/>
+          </p:cNvPicPr>
+          <p:nvPr/>
+        </p:nvPicPr>
+        <p:blipFill>
+          <a:blip r:embed="rId2">
+            <a:extLst>
+              <a:ext uri="{28A0092B-C50C-407E-A947-70E740481C1C}">
+                <a14:useLocalDpi xmlns:a14="http://schemas.microsoft.com/office/drawing/2010/main" val="0"/>
+              </a:ext>
+            </a:extLst>
+          </a:blip>
+          <a:srcRect/>
+          <a:stretch>
+            <a:fillRect/>
+          </a:stretch>
+        </p:blipFill>
+        <p:spPr bwMode="auto">
+          <a:xfrm>
+            <a:off x="318959" y="1123950"/>
+            <a:ext cx="7462966" cy="2124075"/>
+          </a:xfrm>
+          <a:prstGeom prst="rect">
+            <a:avLst/>
+          </a:prstGeom>
+          <a:noFill/>
+          <a:ln>
+            <a:noFill/>
+          </a:ln>
+          <a:effectLst/>
+          <a:extLst>
+            <a:ext uri="{909E8E84-426E-40DD-AFC4-6F175D3DCCD1}">
+              <a14:hiddenFill xmlns:a14="http://schemas.microsoft.com/office/drawing/2010/main">
+                <a:solidFill>
+                  <a:schemeClr val="accent1"/>
+                </a:solidFill>
+              </a14:hiddenFill>
+            </a:ext>
+            <a:ext uri="{91240B29-F687-4F45-9708-019B960494DF}">
+              <a14:hiddenLine xmlns:a14="http://schemas.microsoft.com/office/drawing/2010/main" w="9525">
+                <a:solidFill>
+                  <a:schemeClr val="tx1"/>
+                </a:solidFill>
+                <a:miter lim="800000"/>
+                <a:headEnd/>
+                <a:tailEnd/>
+              </a14:hiddenLine>
+            </a:ext>
+            <a:ext uri="{AF507438-7753-43E0-B8FC-AC1667EBCBE1}">
+              <a14:hiddenEffects xmlns:a14="http://schemas.microsoft.com/office/drawing/2010/main">
+                <a:effectLst>
+                  <a:outerShdw dist="35921" dir="2700000" algn="ctr" rotWithShape="0">
+                    <a:schemeClr val="bg2"/>
+                  </a:outerShdw>
+                </a:effectLst>
+              </a14:hiddenEffects>
+            </a:ext>
+          </a:extLst>
+        </p:spPr>
+      </p:pic>
+      <p:pic>
+        <p:nvPicPr>
+          <p:cNvPr id="3075" name="Picture 3"/>
+          <p:cNvPicPr>
+            <a:picLocks noChangeAspect="1" noChangeArrowheads="1"/>
+          </p:cNvPicPr>
+          <p:nvPr/>
+        </p:nvPicPr>
+        <p:blipFill>
+          <a:blip r:embed="rId3">
+            <a:extLst>
+              <a:ext uri="{28A0092B-C50C-407E-A947-70E740481C1C}">
+                <a14:useLocalDpi xmlns:a14="http://schemas.microsoft.com/office/drawing/2010/main" val="0"/>
+              </a:ext>
+            </a:extLst>
+          </a:blip>
+          <a:srcRect/>
+          <a:stretch>
+            <a:fillRect/>
+          </a:stretch>
+        </p:blipFill>
+        <p:spPr bwMode="auto">
+          <a:xfrm>
+            <a:off x="299909" y="3267077"/>
+            <a:ext cx="7482016" cy="2005267"/>
+          </a:xfrm>
+          <a:prstGeom prst="rect">
+            <a:avLst/>
+          </a:prstGeom>
+          <a:noFill/>
+          <a:ln>
+            <a:noFill/>
+          </a:ln>
+          <a:effectLst/>
+          <a:extLst>
+            <a:ext uri="{909E8E84-426E-40DD-AFC4-6F175D3DCCD1}">
+              <a14:hiddenFill xmlns:a14="http://schemas.microsoft.com/office/drawing/2010/main">
+                <a:solidFill>
+                  <a:schemeClr val="accent1"/>
+                </a:solidFill>
+              </a14:hiddenFill>
+            </a:ext>
+            <a:ext uri="{91240B29-F687-4F45-9708-019B960494DF}">
+              <a14:hiddenLine xmlns:a14="http://schemas.microsoft.com/office/drawing/2010/main" w="9525">
+                <a:solidFill>
+                  <a:schemeClr val="tx1"/>
+                </a:solidFill>
+                <a:miter lim="800000"/>
+                <a:headEnd/>
+                <a:tailEnd/>
+              </a14:hiddenLine>
+            </a:ext>
+            <a:ext uri="{AF507438-7753-43E0-B8FC-AC1667EBCBE1}">
+              <a14:hiddenEffects xmlns:a14="http://schemas.microsoft.com/office/drawing/2010/main">
+                <a:effectLst>
+                  <a:outerShdw dist="35921" dir="2700000" algn="ctr" rotWithShape="0">
+                    <a:schemeClr val="bg2"/>
+                  </a:outerShdw>
+                </a:effectLst>
+              </a14:hiddenEffects>
+            </a:ext>
+          </a:extLst>
+        </p:spPr>
+      </p:pic>
     </p:spTree>
     <p:extLst>
       <p:ext uri="{BB962C8B-B14F-4D97-AF65-F5344CB8AC3E}">

</xml_diff>

<commit_message>
Exception when creating Comp Form - code corrected in WebSite. comp-form-edit.comp.ts.LoadInstituteSiteSummary
</commit_message>
<xml_diff>
--- a/Documents/Technical/Help/UserManual/New Microsoft PowerPoint Presentation.pptx
+++ b/Documents/Technical/Help/UserManual/New Microsoft PowerPoint Presentation.pptx
@@ -204,7 +204,7 @@
           <a:p>
             <a:fld id="{2685F925-F09D-4542-A91E-18699BAAF622}" type="datetimeFigureOut">
               <a:rPr lang="en-US" smtClean="0"/>
-              <a:t>5/14/2017</a:t>
+              <a:t>5/23/2017</a:t>
             </a:fld>
             <a:endParaRPr lang="en-US"/>
           </a:p>
@@ -738,7 +738,7 @@
             <a:fld id="{1D8BD707-D9CF-40AE-B4C6-C98DA3205C09}" type="datetimeFigureOut">
               <a:rPr lang="en-US" smtClean="0"/>
               <a:pPr/>
-              <a:t>5/14/2017</a:t>
+              <a:t>5/23/2017</a:t>
             </a:fld>
             <a:endParaRPr lang="en-US"/>
           </a:p>
@@ -905,7 +905,7 @@
             <a:fld id="{1D8BD707-D9CF-40AE-B4C6-C98DA3205C09}" type="datetimeFigureOut">
               <a:rPr lang="en-US" smtClean="0"/>
               <a:pPr/>
-              <a:t>5/14/2017</a:t>
+              <a:t>5/23/2017</a:t>
             </a:fld>
             <a:endParaRPr lang="en-US"/>
           </a:p>
@@ -1082,7 +1082,7 @@
             <a:fld id="{1D8BD707-D9CF-40AE-B4C6-C98DA3205C09}" type="datetimeFigureOut">
               <a:rPr lang="en-US" smtClean="0"/>
               <a:pPr/>
-              <a:t>5/14/2017</a:t>
+              <a:t>5/23/2017</a:t>
             </a:fld>
             <a:endParaRPr lang="en-US"/>
           </a:p>
@@ -1249,7 +1249,7 @@
             <a:fld id="{1D8BD707-D9CF-40AE-B4C6-C98DA3205C09}" type="datetimeFigureOut">
               <a:rPr lang="en-US" smtClean="0"/>
               <a:pPr/>
-              <a:t>5/14/2017</a:t>
+              <a:t>5/23/2017</a:t>
             </a:fld>
             <a:endParaRPr lang="en-US"/>
           </a:p>
@@ -1492,7 +1492,7 @@
             <a:fld id="{1D8BD707-D9CF-40AE-B4C6-C98DA3205C09}" type="datetimeFigureOut">
               <a:rPr lang="en-US" smtClean="0"/>
               <a:pPr/>
-              <a:t>5/14/2017</a:t>
+              <a:t>5/23/2017</a:t>
             </a:fld>
             <a:endParaRPr lang="en-US"/>
           </a:p>
@@ -1777,7 +1777,7 @@
             <a:fld id="{1D8BD707-D9CF-40AE-B4C6-C98DA3205C09}" type="datetimeFigureOut">
               <a:rPr lang="en-US" smtClean="0"/>
               <a:pPr/>
-              <a:t>5/14/2017</a:t>
+              <a:t>5/23/2017</a:t>
             </a:fld>
             <a:endParaRPr lang="en-US"/>
           </a:p>
@@ -2196,7 +2196,7 @@
             <a:fld id="{1D8BD707-D9CF-40AE-B4C6-C98DA3205C09}" type="datetimeFigureOut">
               <a:rPr lang="en-US" smtClean="0"/>
               <a:pPr/>
-              <a:t>5/14/2017</a:t>
+              <a:t>5/23/2017</a:t>
             </a:fld>
             <a:endParaRPr lang="en-US"/>
           </a:p>
@@ -2311,7 +2311,7 @@
             <a:fld id="{1D8BD707-D9CF-40AE-B4C6-C98DA3205C09}" type="datetimeFigureOut">
               <a:rPr lang="en-US" smtClean="0"/>
               <a:pPr/>
-              <a:t>5/14/2017</a:t>
+              <a:t>5/23/2017</a:t>
             </a:fld>
             <a:endParaRPr lang="en-US"/>
           </a:p>
@@ -2403,7 +2403,7 @@
             <a:fld id="{1D8BD707-D9CF-40AE-B4C6-C98DA3205C09}" type="datetimeFigureOut">
               <a:rPr lang="en-US" smtClean="0"/>
               <a:pPr/>
-              <a:t>5/14/2017</a:t>
+              <a:t>5/23/2017</a:t>
             </a:fld>
             <a:endParaRPr lang="en-US"/>
           </a:p>
@@ -2677,7 +2677,7 @@
             <a:fld id="{1D8BD707-D9CF-40AE-B4C6-C98DA3205C09}" type="datetimeFigureOut">
               <a:rPr lang="en-US" smtClean="0"/>
               <a:pPr/>
-              <a:t>5/14/2017</a:t>
+              <a:t>5/23/2017</a:t>
             </a:fld>
             <a:endParaRPr lang="en-US"/>
           </a:p>
@@ -2927,7 +2927,7 @@
             <a:fld id="{1D8BD707-D9CF-40AE-B4C6-C98DA3205C09}" type="datetimeFigureOut">
               <a:rPr lang="en-US" smtClean="0"/>
               <a:pPr/>
-              <a:t>5/14/2017</a:t>
+              <a:t>5/23/2017</a:t>
             </a:fld>
             <a:endParaRPr lang="en-US"/>
           </a:p>
@@ -3137,7 +3137,7 @@
             <a:fld id="{1D8BD707-D9CF-40AE-B4C6-C98DA3205C09}" type="datetimeFigureOut">
               <a:rPr lang="en-US" smtClean="0"/>
               <a:pPr/>
-              <a:t>5/14/2017</a:t>
+              <a:t>5/23/2017</a:t>
             </a:fld>
             <a:endParaRPr lang="en-US"/>
           </a:p>
@@ -3759,7 +3759,6 @@
               <a:rPr lang="en-US" sz="1000" dirty="0"/>
               <a:t>2</a:t>
             </a:r>
-            <a:endParaRPr lang="en-US" sz="1000" dirty="0"/>
           </a:p>
         </p:txBody>
       </p:sp>
@@ -3831,7 +3830,6 @@
               <a:rPr lang="en-US" sz="1000" dirty="0"/>
               <a:t>3</a:t>
             </a:r>
-            <a:endParaRPr lang="en-US" sz="1000" dirty="0"/>
           </a:p>
         </p:txBody>
       </p:sp>
@@ -3903,7 +3901,6 @@
               <a:rPr lang="en-US" sz="1000" dirty="0"/>
               <a:t>4</a:t>
             </a:r>
-            <a:endParaRPr lang="en-US" sz="1000" dirty="0"/>
           </a:p>
         </p:txBody>
       </p:sp>
@@ -5197,687 +5194,556 @@
           <a:chExt cx="0" cy="0"/>
         </a:xfrm>
       </p:grpSpPr>
-      <p:pic>
-        <p:nvPicPr>
-          <p:cNvPr id="1026" name="Picture 2"/>
-          <p:cNvPicPr>
-            <a:picLocks noChangeAspect="1" noChangeArrowheads="1"/>
-          </p:cNvPicPr>
+      <p:grpSp>
+        <p:nvGrpSpPr>
+          <p:cNvPr id="1025" name="Group 1024"/>
+          <p:cNvGrpSpPr/>
           <p:nvPr/>
-        </p:nvPicPr>
-        <p:blipFill>
-          <a:blip r:embed="rId2">
+        </p:nvGrpSpPr>
+        <p:grpSpPr>
+          <a:xfrm>
+            <a:off x="1009646" y="657224"/>
+            <a:ext cx="6753228" cy="3667126"/>
+            <a:chOff x="161921" y="534114"/>
+            <a:chExt cx="7058028" cy="3905278"/>
+          </a:xfrm>
+        </p:grpSpPr>
+        <p:pic>
+          <p:nvPicPr>
+            <p:cNvPr id="2" name="Picture 2"/>
+            <p:cNvPicPr>
+              <a:picLocks noChangeAspect="1" noChangeArrowheads="1"/>
+            </p:cNvPicPr>
+            <p:nvPr/>
+          </p:nvPicPr>
+          <p:blipFill>
+            <a:blip r:embed="rId2">
+              <a:extLst>
+                <a:ext uri="{28A0092B-C50C-407E-A947-70E740481C1C}">
+                  <a14:useLocalDpi xmlns:a14="http://schemas.microsoft.com/office/drawing/2010/main" val="0"/>
+                </a:ext>
+              </a:extLst>
+            </a:blip>
+            <a:srcRect/>
+            <a:stretch>
+              <a:fillRect/>
+            </a:stretch>
+          </p:blipFill>
+          <p:spPr bwMode="auto">
+            <a:xfrm>
+              <a:off x="161921" y="974408"/>
+              <a:ext cx="6324604" cy="3464984"/>
+            </a:xfrm>
+            <a:prstGeom prst="rect">
+              <a:avLst/>
+            </a:prstGeom>
+            <a:noFill/>
+            <a:ln>
+              <a:noFill/>
+            </a:ln>
+            <a:effectLst/>
             <a:extLst>
-              <a:ext uri="{28A0092B-C50C-407E-A947-70E740481C1C}">
-                <a14:useLocalDpi xmlns:a14="http://schemas.microsoft.com/office/drawing/2010/main" val="0"/>
+              <a:ext uri="{909E8E84-426E-40DD-AFC4-6F175D3DCCD1}">
+                <a14:hiddenFill xmlns:a14="http://schemas.microsoft.com/office/drawing/2010/main">
+                  <a:solidFill>
+                    <a:schemeClr val="accent1"/>
+                  </a:solidFill>
+                </a14:hiddenFill>
+              </a:ext>
+              <a:ext uri="{91240B29-F687-4F45-9708-019B960494DF}">
+                <a14:hiddenLine xmlns:a14="http://schemas.microsoft.com/office/drawing/2010/main" w="9525">
+                  <a:solidFill>
+                    <a:schemeClr val="tx1"/>
+                  </a:solidFill>
+                  <a:miter lim="800000"/>
+                  <a:headEnd/>
+                  <a:tailEnd/>
+                </a14:hiddenLine>
+              </a:ext>
+              <a:ext uri="{AF507438-7753-43E0-B8FC-AC1667EBCBE1}">
+                <a14:hiddenEffects xmlns:a14="http://schemas.microsoft.com/office/drawing/2010/main">
+                  <a:effectLst>
+                    <a:outerShdw dist="35921" dir="2700000" algn="ctr" rotWithShape="0">
+                      <a:schemeClr val="bg2"/>
+                    </a:outerShdw>
+                  </a:effectLst>
+                </a14:hiddenEffects>
               </a:ext>
             </a:extLst>
-          </a:blip>
-          <a:srcRect/>
-          <a:stretch>
-            <a:fillRect/>
-          </a:stretch>
-        </p:blipFill>
-        <p:spPr bwMode="auto">
-          <a:xfrm>
-            <a:off x="1066800" y="2524124"/>
-            <a:ext cx="6629400" cy="3302987"/>
-          </a:xfrm>
-          <a:prstGeom prst="rect">
-            <a:avLst/>
-          </a:prstGeom>
-          <a:noFill/>
-          <a:ln>
+          </p:spPr>
+        </p:pic>
+        <p:cxnSp>
+          <p:nvCxnSpPr>
+            <p:cNvPr id="9" name="Straight Connector 8"/>
+            <p:cNvCxnSpPr/>
+            <p:nvPr/>
+          </p:nvCxnSpPr>
+          <p:spPr>
+            <a:xfrm>
+              <a:off x="6858000" y="2133600"/>
+              <a:ext cx="0" cy="0"/>
+            </a:xfrm>
+            <a:prstGeom prst="line">
+              <a:avLst/>
+            </a:prstGeom>
+            <a:ln w="19050">
+              <a:solidFill>
+                <a:srgbClr val="FF0000"/>
+              </a:solidFill>
+              <a:tailEnd type="oval"/>
+            </a:ln>
+          </p:spPr>
+          <p:style>
+            <a:lnRef idx="1">
+              <a:schemeClr val="accent1"/>
+            </a:lnRef>
+            <a:fillRef idx="0">
+              <a:schemeClr val="accent1"/>
+            </a:fillRef>
+            <a:effectRef idx="0">
+              <a:schemeClr val="accent1"/>
+            </a:effectRef>
+            <a:fontRef idx="minor">
+              <a:schemeClr val="tx1"/>
+            </a:fontRef>
+          </p:style>
+        </p:cxnSp>
+        <p:cxnSp>
+          <p:nvCxnSpPr>
+            <p:cNvPr id="10" name="Straight Connector 9"/>
+            <p:cNvCxnSpPr/>
+            <p:nvPr/>
+          </p:nvCxnSpPr>
+          <p:spPr>
+            <a:xfrm flipH="1">
+              <a:off x="6384128" y="1133475"/>
+              <a:ext cx="330997" cy="0"/>
+            </a:xfrm>
+            <a:prstGeom prst="line">
+              <a:avLst/>
+            </a:prstGeom>
+            <a:ln w="19050">
+              <a:solidFill>
+                <a:srgbClr val="FF0000"/>
+              </a:solidFill>
+              <a:tailEnd type="oval"/>
+            </a:ln>
+          </p:spPr>
+          <p:style>
+            <a:lnRef idx="1">
+              <a:schemeClr val="accent1"/>
+            </a:lnRef>
+            <a:fillRef idx="0">
+              <a:schemeClr val="accent1"/>
+            </a:fillRef>
+            <a:effectRef idx="0">
+              <a:schemeClr val="accent1"/>
+            </a:effectRef>
+            <a:fontRef idx="minor">
+              <a:schemeClr val="tx1"/>
+            </a:fontRef>
+          </p:style>
+        </p:cxnSp>
+        <p:cxnSp>
+          <p:nvCxnSpPr>
+            <p:cNvPr id="11" name="Straight Connector 10"/>
+            <p:cNvCxnSpPr/>
+            <p:nvPr/>
+          </p:nvCxnSpPr>
+          <p:spPr>
+            <a:xfrm flipH="1">
+              <a:off x="6384128" y="1308497"/>
+              <a:ext cx="635797" cy="0"/>
+            </a:xfrm>
+            <a:prstGeom prst="line">
+              <a:avLst/>
+            </a:prstGeom>
+            <a:ln w="19050">
+              <a:solidFill>
+                <a:srgbClr val="FF0000"/>
+              </a:solidFill>
+              <a:tailEnd type="oval"/>
+            </a:ln>
+          </p:spPr>
+          <p:style>
+            <a:lnRef idx="1">
+              <a:schemeClr val="accent1"/>
+            </a:lnRef>
+            <a:fillRef idx="0">
+              <a:schemeClr val="accent1"/>
+            </a:fillRef>
+            <a:effectRef idx="0">
+              <a:schemeClr val="accent1"/>
+            </a:effectRef>
+            <a:fontRef idx="minor">
+              <a:schemeClr val="tx1"/>
+            </a:fontRef>
+          </p:style>
+        </p:cxnSp>
+        <p:cxnSp>
+          <p:nvCxnSpPr>
+            <p:cNvPr id="12" name="Straight Connector 11"/>
+            <p:cNvCxnSpPr/>
+            <p:nvPr/>
+          </p:nvCxnSpPr>
+          <p:spPr>
+            <a:xfrm flipH="1">
+              <a:off x="6447232" y="1816991"/>
+              <a:ext cx="254794" cy="0"/>
+            </a:xfrm>
+            <a:prstGeom prst="line">
+              <a:avLst/>
+            </a:prstGeom>
+            <a:ln w="19050">
+              <a:solidFill>
+                <a:srgbClr val="FF0000"/>
+              </a:solidFill>
+              <a:tailEnd type="oval"/>
+            </a:ln>
+          </p:spPr>
+          <p:style>
+            <a:lnRef idx="1">
+              <a:schemeClr val="accent1"/>
+            </a:lnRef>
+            <a:fillRef idx="0">
+              <a:schemeClr val="accent1"/>
+            </a:fillRef>
+            <a:effectRef idx="0">
+              <a:schemeClr val="accent1"/>
+            </a:effectRef>
+            <a:fontRef idx="minor">
+              <a:schemeClr val="tx1"/>
+            </a:fontRef>
+          </p:style>
+        </p:cxnSp>
+        <p:cxnSp>
+          <p:nvCxnSpPr>
+            <p:cNvPr id="13" name="Straight Connector 12"/>
+            <p:cNvCxnSpPr/>
+            <p:nvPr/>
+          </p:nvCxnSpPr>
+          <p:spPr>
+            <a:xfrm flipH="1">
+              <a:off x="6332928" y="2267664"/>
+              <a:ext cx="661986" cy="0"/>
+            </a:xfrm>
+            <a:prstGeom prst="line">
+              <a:avLst/>
+            </a:prstGeom>
+            <a:ln w="19050">
+              <a:solidFill>
+                <a:srgbClr val="FF0000"/>
+              </a:solidFill>
+              <a:tailEnd type="oval"/>
+            </a:ln>
+          </p:spPr>
+          <p:style>
+            <a:lnRef idx="1">
+              <a:schemeClr val="accent1"/>
+            </a:lnRef>
+            <a:fillRef idx="0">
+              <a:schemeClr val="accent1"/>
+            </a:fillRef>
+            <a:effectRef idx="0">
+              <a:schemeClr val="accent1"/>
+            </a:effectRef>
+            <a:fontRef idx="minor">
+              <a:schemeClr val="tx1"/>
+            </a:fontRef>
+          </p:style>
+        </p:cxnSp>
+        <p:sp>
+          <p:nvSpPr>
+            <p:cNvPr id="16" name="TextBox 15"/>
+            <p:cNvSpPr txBox="1"/>
+            <p:nvPr/>
+          </p:nvSpPr>
+          <p:spPr>
+            <a:xfrm>
+              <a:off x="6715125" y="953929"/>
+              <a:ext cx="200024" cy="246221"/>
+            </a:xfrm>
+            <a:prstGeom prst="rect">
+              <a:avLst/>
+            </a:prstGeom>
             <a:noFill/>
-          </a:ln>
-          <a:effectLst/>
-          <a:extLst>
-            <a:ext uri="{909E8E84-426E-40DD-AFC4-6F175D3DCCD1}">
-              <a14:hiddenFill xmlns:a14="http://schemas.microsoft.com/office/drawing/2010/main">
-                <a:solidFill>
-                  <a:schemeClr val="accent1"/>
-                </a:solidFill>
-              </a14:hiddenFill>
-            </a:ext>
-            <a:ext uri="{91240B29-F687-4F45-9708-019B960494DF}">
-              <a14:hiddenLine xmlns:a14="http://schemas.microsoft.com/office/drawing/2010/main" w="9525">
-                <a:solidFill>
-                  <a:schemeClr val="tx1"/>
-                </a:solidFill>
-                <a:miter lim="800000"/>
-                <a:headEnd/>
-                <a:tailEnd/>
-              </a14:hiddenLine>
-            </a:ext>
-            <a:ext uri="{AF507438-7753-43E0-B8FC-AC1667EBCBE1}">
-              <a14:hiddenEffects xmlns:a14="http://schemas.microsoft.com/office/drawing/2010/main">
-                <a:effectLst>
-                  <a:outerShdw dist="35921" dir="2700000" algn="ctr" rotWithShape="0">
-                    <a:schemeClr val="bg2"/>
-                  </a:outerShdw>
-                </a:effectLst>
-              </a14:hiddenEffects>
-            </a:ext>
-          </a:extLst>
-        </p:spPr>
-      </p:pic>
-      <p:cxnSp>
-        <p:nvCxnSpPr>
-          <p:cNvPr id="7" name="Straight Connector 6"/>
-          <p:cNvCxnSpPr>
-            <a:stCxn id="23" idx="2"/>
-          </p:cNvCxnSpPr>
-          <p:nvPr/>
-        </p:nvCxnSpPr>
-        <p:spPr>
-          <a:xfrm flipH="1">
-            <a:off x="1953814" y="2332910"/>
-            <a:ext cx="5953" cy="1096090"/>
-          </a:xfrm>
-          <a:prstGeom prst="line">
-            <a:avLst/>
-          </a:prstGeom>
-          <a:ln w="19050">
-            <a:solidFill>
-              <a:srgbClr val="FF0000"/>
-            </a:solidFill>
-            <a:tailEnd type="oval"/>
-          </a:ln>
-        </p:spPr>
-        <p:style>
-          <a:lnRef idx="1">
-            <a:schemeClr val="accent1"/>
-          </a:lnRef>
-          <a:fillRef idx="0">
-            <a:schemeClr val="accent1"/>
-          </a:fillRef>
-          <a:effectRef idx="0">
-            <a:schemeClr val="accent1"/>
-          </a:effectRef>
-          <a:fontRef idx="minor">
-            <a:schemeClr val="tx1"/>
-          </a:fontRef>
-        </p:style>
-      </p:cxnSp>
-      <p:cxnSp>
-        <p:nvCxnSpPr>
-          <p:cNvPr id="8" name="Straight Connector 7"/>
-          <p:cNvCxnSpPr>
-            <a:stCxn id="22" idx="2"/>
-          </p:cNvCxnSpPr>
-          <p:nvPr/>
-        </p:nvCxnSpPr>
-        <p:spPr>
-          <a:xfrm>
-            <a:off x="2947988" y="2332910"/>
-            <a:ext cx="0" cy="1096090"/>
-          </a:xfrm>
-          <a:prstGeom prst="line">
-            <a:avLst/>
-          </a:prstGeom>
-          <a:ln w="19050">
-            <a:solidFill>
-              <a:srgbClr val="FF0000"/>
-            </a:solidFill>
-            <a:tailEnd type="oval"/>
-          </a:ln>
-        </p:spPr>
-        <p:style>
-          <a:lnRef idx="1">
-            <a:schemeClr val="accent1"/>
-          </a:lnRef>
-          <a:fillRef idx="0">
-            <a:schemeClr val="accent1"/>
-          </a:fillRef>
-          <a:effectRef idx="0">
-            <a:schemeClr val="accent1"/>
-          </a:effectRef>
-          <a:fontRef idx="minor">
-            <a:schemeClr val="tx1"/>
-          </a:fontRef>
-        </p:style>
-      </p:cxnSp>
-      <p:cxnSp>
-        <p:nvCxnSpPr>
-          <p:cNvPr id="9" name="Straight Connector 8"/>
-          <p:cNvCxnSpPr/>
-          <p:nvPr/>
-        </p:nvCxnSpPr>
-        <p:spPr>
-          <a:xfrm>
-            <a:off x="6858000" y="2133600"/>
-            <a:ext cx="0" cy="0"/>
-          </a:xfrm>
-          <a:prstGeom prst="line">
-            <a:avLst/>
-          </a:prstGeom>
-          <a:ln w="19050">
-            <a:solidFill>
-              <a:srgbClr val="FF0000"/>
-            </a:solidFill>
-            <a:tailEnd type="oval"/>
-          </a:ln>
-        </p:spPr>
-        <p:style>
-          <a:lnRef idx="1">
-            <a:schemeClr val="accent1"/>
-          </a:lnRef>
-          <a:fillRef idx="0">
-            <a:schemeClr val="accent1"/>
-          </a:fillRef>
-          <a:effectRef idx="0">
-            <a:schemeClr val="accent1"/>
-          </a:effectRef>
-          <a:fontRef idx="minor">
-            <a:schemeClr val="tx1"/>
-          </a:fontRef>
-        </p:style>
-      </p:cxnSp>
-      <p:cxnSp>
-        <p:nvCxnSpPr>
-          <p:cNvPr id="10" name="Straight Connector 9"/>
-          <p:cNvCxnSpPr/>
-          <p:nvPr/>
-        </p:nvCxnSpPr>
-        <p:spPr>
-          <a:xfrm flipH="1">
-            <a:off x="7496176" y="3141821"/>
-            <a:ext cx="933448" cy="0"/>
-          </a:xfrm>
-          <a:prstGeom prst="line">
-            <a:avLst/>
-          </a:prstGeom>
-          <a:ln w="19050">
-            <a:solidFill>
-              <a:srgbClr val="FF0000"/>
-            </a:solidFill>
-            <a:tailEnd type="oval"/>
-          </a:ln>
-        </p:spPr>
-        <p:style>
-          <a:lnRef idx="1">
-            <a:schemeClr val="accent1"/>
-          </a:lnRef>
-          <a:fillRef idx="0">
-            <a:schemeClr val="accent1"/>
-          </a:fillRef>
-          <a:effectRef idx="0">
-            <a:schemeClr val="accent1"/>
-          </a:effectRef>
-          <a:fontRef idx="minor">
-            <a:schemeClr val="tx1"/>
-          </a:fontRef>
-        </p:style>
-      </p:cxnSp>
-      <p:cxnSp>
-        <p:nvCxnSpPr>
-          <p:cNvPr id="11" name="Straight Connector 10"/>
-          <p:cNvCxnSpPr/>
-          <p:nvPr/>
-        </p:nvCxnSpPr>
-        <p:spPr>
-          <a:xfrm flipH="1">
-            <a:off x="7496176" y="3505200"/>
-            <a:ext cx="609600" cy="0"/>
-          </a:xfrm>
-          <a:prstGeom prst="line">
-            <a:avLst/>
-          </a:prstGeom>
-          <a:ln w="19050">
-            <a:solidFill>
-              <a:srgbClr val="FF0000"/>
-            </a:solidFill>
-            <a:tailEnd type="oval"/>
-          </a:ln>
-        </p:spPr>
-        <p:style>
-          <a:lnRef idx="1">
-            <a:schemeClr val="accent1"/>
-          </a:lnRef>
-          <a:fillRef idx="0">
-            <a:schemeClr val="accent1"/>
-          </a:fillRef>
-          <a:effectRef idx="0">
-            <a:schemeClr val="accent1"/>
-          </a:effectRef>
-          <a:fontRef idx="minor">
-            <a:schemeClr val="tx1"/>
-          </a:fontRef>
-        </p:style>
-      </p:cxnSp>
-      <p:cxnSp>
-        <p:nvCxnSpPr>
-          <p:cNvPr id="12" name="Straight Connector 11"/>
-          <p:cNvCxnSpPr/>
-          <p:nvPr/>
-        </p:nvCxnSpPr>
-        <p:spPr>
-          <a:xfrm flipH="1">
-            <a:off x="7596188" y="4006312"/>
-            <a:ext cx="509588" cy="0"/>
-          </a:xfrm>
-          <a:prstGeom prst="line">
-            <a:avLst/>
-          </a:prstGeom>
-          <a:ln w="19050">
-            <a:solidFill>
-              <a:srgbClr val="FF0000"/>
-            </a:solidFill>
-            <a:tailEnd type="oval"/>
-          </a:ln>
-        </p:spPr>
-        <p:style>
-          <a:lnRef idx="1">
-            <a:schemeClr val="accent1"/>
-          </a:lnRef>
-          <a:fillRef idx="0">
-            <a:schemeClr val="accent1"/>
-          </a:fillRef>
-          <a:effectRef idx="0">
-            <a:schemeClr val="accent1"/>
-          </a:effectRef>
-          <a:fontRef idx="minor">
-            <a:schemeClr val="tx1"/>
-          </a:fontRef>
-        </p:style>
-      </p:cxnSp>
-      <p:cxnSp>
-        <p:nvCxnSpPr>
-          <p:cNvPr id="13" name="Straight Connector 12"/>
-          <p:cNvCxnSpPr/>
-          <p:nvPr/>
-        </p:nvCxnSpPr>
-        <p:spPr>
-          <a:xfrm flipH="1">
-            <a:off x="7467600" y="4724400"/>
-            <a:ext cx="661986" cy="0"/>
-          </a:xfrm>
-          <a:prstGeom prst="line">
-            <a:avLst/>
-          </a:prstGeom>
-          <a:ln w="19050">
-            <a:solidFill>
-              <a:srgbClr val="FF0000"/>
-            </a:solidFill>
-            <a:tailEnd type="oval"/>
-          </a:ln>
-        </p:spPr>
-        <p:style>
-          <a:lnRef idx="1">
-            <a:schemeClr val="accent1"/>
-          </a:lnRef>
-          <a:fillRef idx="0">
-            <a:schemeClr val="accent1"/>
-          </a:fillRef>
-          <a:effectRef idx="0">
-            <a:schemeClr val="accent1"/>
-          </a:effectRef>
-          <a:fontRef idx="minor">
-            <a:schemeClr val="tx1"/>
-          </a:fontRef>
-        </p:style>
-      </p:cxnSp>
-      <p:cxnSp>
-        <p:nvCxnSpPr>
-          <p:cNvPr id="14" name="Straight Connector 13"/>
-          <p:cNvCxnSpPr/>
-          <p:nvPr/>
-        </p:nvCxnSpPr>
-        <p:spPr>
-          <a:xfrm flipH="1">
-            <a:off x="6934200" y="5011579"/>
-            <a:ext cx="1495424" cy="0"/>
-          </a:xfrm>
-          <a:prstGeom prst="line">
-            <a:avLst/>
-          </a:prstGeom>
-          <a:ln w="19050">
-            <a:solidFill>
-              <a:srgbClr val="FF0000"/>
-            </a:solidFill>
-            <a:tailEnd type="oval"/>
-          </a:ln>
-        </p:spPr>
-        <p:style>
-          <a:lnRef idx="1">
-            <a:schemeClr val="accent1"/>
-          </a:lnRef>
-          <a:fillRef idx="0">
-            <a:schemeClr val="accent1"/>
-          </a:fillRef>
-          <a:effectRef idx="0">
-            <a:schemeClr val="accent1"/>
-          </a:effectRef>
-          <a:fontRef idx="minor">
-            <a:schemeClr val="tx1"/>
-          </a:fontRef>
-        </p:style>
-      </p:cxnSp>
-      <p:cxnSp>
-        <p:nvCxnSpPr>
-          <p:cNvPr id="15" name="Straight Connector 14"/>
-          <p:cNvCxnSpPr>
-            <a:stCxn id="21" idx="1"/>
-          </p:cNvCxnSpPr>
-          <p:nvPr/>
-        </p:nvCxnSpPr>
-        <p:spPr>
-          <a:xfrm flipH="1">
-            <a:off x="6934200" y="5181600"/>
-            <a:ext cx="1195386" cy="0"/>
-          </a:xfrm>
-          <a:prstGeom prst="line">
-            <a:avLst/>
-          </a:prstGeom>
-          <a:ln w="19050">
-            <a:solidFill>
-              <a:srgbClr val="FF0000"/>
-            </a:solidFill>
-            <a:tailEnd type="oval"/>
-          </a:ln>
-        </p:spPr>
-        <p:style>
-          <a:lnRef idx="1">
-            <a:schemeClr val="accent1"/>
-          </a:lnRef>
-          <a:fillRef idx="0">
-            <a:schemeClr val="accent1"/>
-          </a:fillRef>
-          <a:effectRef idx="0">
-            <a:schemeClr val="accent1"/>
-          </a:effectRef>
-          <a:fontRef idx="minor">
-            <a:schemeClr val="tx1"/>
-          </a:fontRef>
-        </p:style>
-      </p:cxnSp>
-      <p:sp>
-        <p:nvSpPr>
-          <p:cNvPr id="16" name="TextBox 15"/>
-          <p:cNvSpPr txBox="1"/>
-          <p:nvPr/>
-        </p:nvSpPr>
-        <p:spPr>
-          <a:xfrm>
-            <a:off x="8429624" y="2971800"/>
-            <a:ext cx="200024" cy="246221"/>
-          </a:xfrm>
-          <a:prstGeom prst="rect">
-            <a:avLst/>
-          </a:prstGeom>
-          <a:noFill/>
-          <a:ln w="19050">
-            <a:solidFill>
-              <a:srgbClr val="FF0000"/>
-            </a:solidFill>
-          </a:ln>
-        </p:spPr>
-        <p:txBody>
-          <a:bodyPr wrap="square" rtlCol="0">
-            <a:spAutoFit/>
-          </a:bodyPr>
-          <a:lstStyle/>
-          <a:p>
-            <a:pPr algn="ctr"/>
-            <a:r>
-              <a:rPr lang="en-US" sz="1000" dirty="0" smtClean="0"/>
-              <a:t>3</a:t>
-            </a:r>
-            <a:endParaRPr lang="en-US" sz="1000" dirty="0"/>
-          </a:p>
-        </p:txBody>
-      </p:sp>
-      <p:sp>
-        <p:nvSpPr>
-          <p:cNvPr id="17" name="TextBox 16"/>
-          <p:cNvSpPr txBox="1"/>
-          <p:nvPr/>
-        </p:nvSpPr>
-        <p:spPr>
-          <a:xfrm>
-            <a:off x="8105776" y="3305889"/>
-            <a:ext cx="200024" cy="246221"/>
-          </a:xfrm>
-          <a:prstGeom prst="rect">
-            <a:avLst/>
-          </a:prstGeom>
-          <a:noFill/>
-          <a:ln w="19050">
-            <a:solidFill>
-              <a:srgbClr val="FF0000"/>
-            </a:solidFill>
-          </a:ln>
-        </p:spPr>
-        <p:txBody>
-          <a:bodyPr wrap="square" rtlCol="0">
-            <a:spAutoFit/>
-          </a:bodyPr>
-          <a:lstStyle/>
-          <a:p>
-            <a:pPr algn="ctr"/>
-            <a:r>
-              <a:rPr lang="en-US" sz="1000" dirty="0" smtClean="0"/>
-              <a:t>4</a:t>
-            </a:r>
-            <a:endParaRPr lang="en-US" sz="1000" dirty="0"/>
-          </a:p>
-        </p:txBody>
-      </p:sp>
-      <p:sp>
-        <p:nvSpPr>
-          <p:cNvPr id="18" name="TextBox 17"/>
-          <p:cNvSpPr txBox="1"/>
-          <p:nvPr/>
-        </p:nvSpPr>
-        <p:spPr>
-          <a:xfrm>
-            <a:off x="8105776" y="3919871"/>
-            <a:ext cx="200024" cy="246221"/>
-          </a:xfrm>
-          <a:prstGeom prst="rect">
-            <a:avLst/>
-          </a:prstGeom>
-          <a:noFill/>
-          <a:ln w="19050">
-            <a:solidFill>
-              <a:srgbClr val="FF0000"/>
-            </a:solidFill>
-          </a:ln>
-        </p:spPr>
-        <p:txBody>
-          <a:bodyPr wrap="square" rtlCol="0">
-            <a:spAutoFit/>
-          </a:bodyPr>
-          <a:lstStyle/>
-          <a:p>
-            <a:pPr algn="ctr"/>
-            <a:r>
-              <a:rPr lang="en-US" sz="1000" dirty="0"/>
-              <a:t>5</a:t>
-            </a:r>
-          </a:p>
-        </p:txBody>
-      </p:sp>
-      <p:sp>
-        <p:nvSpPr>
-          <p:cNvPr id="19" name="TextBox 18"/>
-          <p:cNvSpPr txBox="1"/>
-          <p:nvPr/>
-        </p:nvSpPr>
-        <p:spPr>
-          <a:xfrm>
-            <a:off x="8129586" y="4572000"/>
-            <a:ext cx="200024" cy="246221"/>
-          </a:xfrm>
-          <a:prstGeom prst="rect">
-            <a:avLst/>
-          </a:prstGeom>
-          <a:noFill/>
-          <a:ln w="19050">
-            <a:solidFill>
-              <a:srgbClr val="FF0000"/>
-            </a:solidFill>
-          </a:ln>
-        </p:spPr>
-        <p:txBody>
-          <a:bodyPr wrap="square" rtlCol="0">
-            <a:spAutoFit/>
-          </a:bodyPr>
-          <a:lstStyle/>
-          <a:p>
-            <a:pPr algn="ctr"/>
-            <a:r>
-              <a:rPr lang="en-US" sz="1000" dirty="0" smtClean="0"/>
-              <a:t>6</a:t>
-            </a:r>
-            <a:endParaRPr lang="en-US" sz="1000" dirty="0"/>
-          </a:p>
-        </p:txBody>
-      </p:sp>
-      <p:sp>
-        <p:nvSpPr>
-          <p:cNvPr id="20" name="TextBox 19"/>
-          <p:cNvSpPr txBox="1"/>
-          <p:nvPr/>
-        </p:nvSpPr>
-        <p:spPr>
-          <a:xfrm>
-            <a:off x="8429624" y="4935379"/>
-            <a:ext cx="200024" cy="246221"/>
-          </a:xfrm>
-          <a:prstGeom prst="rect">
-            <a:avLst/>
-          </a:prstGeom>
-          <a:noFill/>
-          <a:ln w="19050">
-            <a:solidFill>
-              <a:srgbClr val="FF0000"/>
-            </a:solidFill>
-          </a:ln>
-        </p:spPr>
-        <p:txBody>
-          <a:bodyPr wrap="square" rtlCol="0">
-            <a:spAutoFit/>
-          </a:bodyPr>
-          <a:lstStyle/>
-          <a:p>
-            <a:pPr algn="ctr"/>
-            <a:r>
-              <a:rPr lang="en-US" sz="1000" dirty="0" smtClean="0"/>
-              <a:t>7</a:t>
-            </a:r>
-            <a:endParaRPr lang="en-US" sz="1000" dirty="0"/>
-          </a:p>
-        </p:txBody>
-      </p:sp>
-      <p:sp>
-        <p:nvSpPr>
-          <p:cNvPr id="21" name="TextBox 20"/>
-          <p:cNvSpPr txBox="1"/>
-          <p:nvPr/>
-        </p:nvSpPr>
-        <p:spPr>
-          <a:xfrm>
-            <a:off x="8129586" y="5058489"/>
-            <a:ext cx="176212" cy="246221"/>
-          </a:xfrm>
-          <a:prstGeom prst="rect">
-            <a:avLst/>
-          </a:prstGeom>
-          <a:noFill/>
-          <a:ln w="19050">
-            <a:solidFill>
-              <a:srgbClr val="FF0000"/>
-            </a:solidFill>
-          </a:ln>
-        </p:spPr>
-        <p:txBody>
-          <a:bodyPr wrap="square" rtlCol="0">
-            <a:spAutoFit/>
-          </a:bodyPr>
-          <a:lstStyle/>
-          <a:p>
-            <a:pPr algn="ctr"/>
-            <a:r>
-              <a:rPr lang="en-US" sz="1000" dirty="0" smtClean="0"/>
-              <a:t>8</a:t>
-            </a:r>
-            <a:endParaRPr lang="en-US" sz="1000" dirty="0"/>
-          </a:p>
-        </p:txBody>
-      </p:sp>
-      <p:sp>
-        <p:nvSpPr>
-          <p:cNvPr id="22" name="TextBox 21"/>
-          <p:cNvSpPr txBox="1"/>
-          <p:nvPr/>
-        </p:nvSpPr>
-        <p:spPr>
-          <a:xfrm>
-            <a:off x="2847976" y="2086689"/>
-            <a:ext cx="200024" cy="246221"/>
-          </a:xfrm>
-          <a:prstGeom prst="rect">
-            <a:avLst/>
-          </a:prstGeom>
-          <a:noFill/>
-          <a:ln w="19050">
-            <a:solidFill>
-              <a:srgbClr val="FF0000"/>
-            </a:solidFill>
-          </a:ln>
-        </p:spPr>
-        <p:txBody>
-          <a:bodyPr wrap="square" rtlCol="0">
-            <a:spAutoFit/>
-          </a:bodyPr>
-          <a:lstStyle/>
-          <a:p>
-            <a:pPr algn="ctr"/>
-            <a:r>
-              <a:rPr lang="en-US" sz="1000" dirty="0" smtClean="0"/>
-              <a:t>2</a:t>
-            </a:r>
-            <a:endParaRPr lang="en-US" sz="1000" dirty="0"/>
-          </a:p>
-        </p:txBody>
-      </p:sp>
-      <p:sp>
-        <p:nvSpPr>
-          <p:cNvPr id="23" name="TextBox 22"/>
-          <p:cNvSpPr txBox="1"/>
-          <p:nvPr/>
-        </p:nvSpPr>
-        <p:spPr>
-          <a:xfrm>
-            <a:off x="1859755" y="2086689"/>
-            <a:ext cx="200024" cy="246221"/>
-          </a:xfrm>
-          <a:prstGeom prst="rect">
-            <a:avLst/>
-          </a:prstGeom>
-          <a:noFill/>
-          <a:ln w="19050">
-            <a:solidFill>
-              <a:srgbClr val="FF0000"/>
-            </a:solidFill>
-          </a:ln>
-        </p:spPr>
-        <p:txBody>
-          <a:bodyPr wrap="square" rtlCol="0">
-            <a:spAutoFit/>
-          </a:bodyPr>
-          <a:lstStyle/>
-          <a:p>
-            <a:pPr algn="ctr"/>
-            <a:r>
-              <a:rPr lang="en-US" sz="1000" dirty="0" smtClean="0"/>
-              <a:t>1</a:t>
-            </a:r>
-            <a:endParaRPr lang="en-US" sz="1000" dirty="0"/>
-          </a:p>
-        </p:txBody>
-      </p:sp>
+            <a:ln w="19050">
+              <a:solidFill>
+                <a:srgbClr val="FF0000"/>
+              </a:solidFill>
+            </a:ln>
+          </p:spPr>
+          <p:txBody>
+            <a:bodyPr wrap="square" rtlCol="0">
+              <a:spAutoFit/>
+            </a:bodyPr>
+            <a:lstStyle/>
+            <a:p>
+              <a:pPr algn="ctr"/>
+              <a:r>
+                <a:rPr lang="en-US" sz="1000" dirty="0" smtClean="0"/>
+                <a:t>3</a:t>
+              </a:r>
+              <a:endParaRPr lang="en-US" sz="1000" dirty="0"/>
+            </a:p>
+          </p:txBody>
+        </p:sp>
+        <p:sp>
+          <p:nvSpPr>
+            <p:cNvPr id="17" name="TextBox 16"/>
+            <p:cNvSpPr txBox="1"/>
+            <p:nvPr/>
+          </p:nvSpPr>
+          <p:spPr>
+            <a:xfrm>
+              <a:off x="7019925" y="1200150"/>
+              <a:ext cx="200024" cy="246221"/>
+            </a:xfrm>
+            <a:prstGeom prst="rect">
+              <a:avLst/>
+            </a:prstGeom>
+            <a:noFill/>
+            <a:ln w="19050">
+              <a:solidFill>
+                <a:srgbClr val="FF0000"/>
+              </a:solidFill>
+            </a:ln>
+          </p:spPr>
+          <p:txBody>
+            <a:bodyPr wrap="square" rtlCol="0">
+              <a:spAutoFit/>
+            </a:bodyPr>
+            <a:lstStyle/>
+            <a:p>
+              <a:pPr algn="ctr"/>
+              <a:r>
+                <a:rPr lang="en-US" sz="1000" dirty="0" smtClean="0"/>
+                <a:t>4</a:t>
+              </a:r>
+              <a:endParaRPr lang="en-US" sz="1000" dirty="0"/>
+            </a:p>
+          </p:txBody>
+        </p:sp>
+        <p:sp>
+          <p:nvSpPr>
+            <p:cNvPr id="18" name="TextBox 17"/>
+            <p:cNvSpPr txBox="1"/>
+            <p:nvPr/>
+          </p:nvSpPr>
+          <p:spPr>
+            <a:xfrm>
+              <a:off x="6715125" y="1655779"/>
+              <a:ext cx="200024" cy="246221"/>
+            </a:xfrm>
+            <a:prstGeom prst="rect">
+              <a:avLst/>
+            </a:prstGeom>
+            <a:noFill/>
+            <a:ln w="19050">
+              <a:solidFill>
+                <a:srgbClr val="FF0000"/>
+              </a:solidFill>
+            </a:ln>
+          </p:spPr>
+          <p:txBody>
+            <a:bodyPr wrap="square" rtlCol="0">
+              <a:spAutoFit/>
+            </a:bodyPr>
+            <a:lstStyle/>
+            <a:p>
+              <a:pPr algn="ctr"/>
+              <a:r>
+                <a:rPr lang="en-US" sz="1000" dirty="0"/>
+                <a:t>5</a:t>
+              </a:r>
+            </a:p>
+          </p:txBody>
+        </p:sp>
+        <p:sp>
+          <p:nvSpPr>
+            <p:cNvPr id="19" name="TextBox 18"/>
+            <p:cNvSpPr txBox="1"/>
+            <p:nvPr/>
+          </p:nvSpPr>
+          <p:spPr>
+            <a:xfrm>
+              <a:off x="7019925" y="2133600"/>
+              <a:ext cx="200024" cy="246221"/>
+            </a:xfrm>
+            <a:prstGeom prst="rect">
+              <a:avLst/>
+            </a:prstGeom>
+            <a:noFill/>
+            <a:ln w="19050">
+              <a:solidFill>
+                <a:srgbClr val="FF0000"/>
+              </a:solidFill>
+            </a:ln>
+          </p:spPr>
+          <p:txBody>
+            <a:bodyPr wrap="square" rtlCol="0">
+              <a:spAutoFit/>
+            </a:bodyPr>
+            <a:lstStyle/>
+            <a:p>
+              <a:pPr algn="ctr"/>
+              <a:r>
+                <a:rPr lang="en-US" sz="1000" dirty="0" smtClean="0"/>
+                <a:t>6</a:t>
+              </a:r>
+              <a:endParaRPr lang="en-US" sz="1000" dirty="0"/>
+            </a:p>
+          </p:txBody>
+        </p:sp>
+        <p:cxnSp>
+          <p:nvCxnSpPr>
+            <p:cNvPr id="24" name="Straight Connector 23"/>
+            <p:cNvCxnSpPr>
+              <a:stCxn id="27" idx="2"/>
+            </p:cNvCxnSpPr>
+            <p:nvPr/>
+          </p:nvCxnSpPr>
+          <p:spPr>
+            <a:xfrm>
+              <a:off x="473867" y="780335"/>
+              <a:ext cx="0" cy="507683"/>
+            </a:xfrm>
+            <a:prstGeom prst="line">
+              <a:avLst/>
+            </a:prstGeom>
+            <a:ln w="19050">
+              <a:solidFill>
+                <a:srgbClr val="FF0000"/>
+              </a:solidFill>
+              <a:tailEnd type="oval"/>
+            </a:ln>
+          </p:spPr>
+          <p:style>
+            <a:lnRef idx="1">
+              <a:schemeClr val="accent1"/>
+            </a:lnRef>
+            <a:fillRef idx="0">
+              <a:schemeClr val="accent1"/>
+            </a:fillRef>
+            <a:effectRef idx="0">
+              <a:schemeClr val="accent1"/>
+            </a:effectRef>
+            <a:fontRef idx="minor">
+              <a:schemeClr val="tx1"/>
+            </a:fontRef>
+          </p:style>
+        </p:cxnSp>
+        <p:cxnSp>
+          <p:nvCxnSpPr>
+            <p:cNvPr id="25" name="Straight Connector 24"/>
+            <p:cNvCxnSpPr>
+              <a:stCxn id="26" idx="2"/>
+            </p:cNvCxnSpPr>
+            <p:nvPr/>
+          </p:nvCxnSpPr>
+          <p:spPr>
+            <a:xfrm>
+              <a:off x="1462088" y="780335"/>
+              <a:ext cx="0" cy="507683"/>
+            </a:xfrm>
+            <a:prstGeom prst="line">
+              <a:avLst/>
+            </a:prstGeom>
+            <a:ln w="19050">
+              <a:solidFill>
+                <a:srgbClr val="FF0000"/>
+              </a:solidFill>
+              <a:tailEnd type="oval"/>
+            </a:ln>
+          </p:spPr>
+          <p:style>
+            <a:lnRef idx="1">
+              <a:schemeClr val="accent1"/>
+            </a:lnRef>
+            <a:fillRef idx="0">
+              <a:schemeClr val="accent1"/>
+            </a:fillRef>
+            <a:effectRef idx="0">
+              <a:schemeClr val="accent1"/>
+            </a:effectRef>
+            <a:fontRef idx="minor">
+              <a:schemeClr val="tx1"/>
+            </a:fontRef>
+          </p:style>
+        </p:cxnSp>
+        <p:sp>
+          <p:nvSpPr>
+            <p:cNvPr id="26" name="TextBox 25"/>
+            <p:cNvSpPr txBox="1"/>
+            <p:nvPr/>
+          </p:nvSpPr>
+          <p:spPr>
+            <a:xfrm>
+              <a:off x="1362076" y="534114"/>
+              <a:ext cx="200024" cy="246221"/>
+            </a:xfrm>
+            <a:prstGeom prst="rect">
+              <a:avLst/>
+            </a:prstGeom>
+            <a:noFill/>
+            <a:ln w="19050">
+              <a:solidFill>
+                <a:srgbClr val="FF0000"/>
+              </a:solidFill>
+            </a:ln>
+          </p:spPr>
+          <p:txBody>
+            <a:bodyPr wrap="square" rtlCol="0">
+              <a:spAutoFit/>
+            </a:bodyPr>
+            <a:lstStyle/>
+            <a:p>
+              <a:pPr algn="ctr"/>
+              <a:r>
+                <a:rPr lang="en-US" sz="1000" dirty="0" smtClean="0"/>
+                <a:t>2</a:t>
+              </a:r>
+              <a:endParaRPr lang="en-US" sz="1000" dirty="0"/>
+            </a:p>
+          </p:txBody>
+        </p:sp>
+        <p:sp>
+          <p:nvSpPr>
+            <p:cNvPr id="27" name="TextBox 26"/>
+            <p:cNvSpPr txBox="1"/>
+            <p:nvPr/>
+          </p:nvSpPr>
+          <p:spPr>
+            <a:xfrm>
+              <a:off x="373855" y="534114"/>
+              <a:ext cx="200024" cy="246221"/>
+            </a:xfrm>
+            <a:prstGeom prst="rect">
+              <a:avLst/>
+            </a:prstGeom>
+            <a:noFill/>
+            <a:ln w="19050">
+              <a:solidFill>
+                <a:srgbClr val="FF0000"/>
+              </a:solidFill>
+            </a:ln>
+          </p:spPr>
+          <p:txBody>
+            <a:bodyPr wrap="square" rtlCol="0">
+              <a:spAutoFit/>
+            </a:bodyPr>
+            <a:lstStyle/>
+            <a:p>
+              <a:pPr algn="ctr"/>
+              <a:r>
+                <a:rPr lang="en-US" sz="1000" dirty="0" smtClean="0"/>
+                <a:t>1</a:t>
+              </a:r>
+              <a:endParaRPr lang="en-US" sz="1000" dirty="0"/>
+            </a:p>
+          </p:txBody>
+        </p:sp>
+      </p:grpSp>
     </p:spTree>
     <p:extLst>
       <p:ext uri="{BB962C8B-B14F-4D97-AF65-F5344CB8AC3E}">
@@ -5910,10 +5776,8 @@
       </p:grpSpPr>
       <p:pic>
         <p:nvPicPr>
-          <p:cNvPr id="1026" name="Picture 2"/>
-          <p:cNvPicPr>
-            <a:picLocks noChangeAspect="1" noChangeArrowheads="1"/>
-          </p:cNvPicPr>
+          <p:cNvPr id="3" name="Picture 2"/>
+          <p:cNvPicPr/>
           <p:nvPr/>
         </p:nvPicPr>
         <p:blipFill>
@@ -5931,45 +5795,18 @@
         </p:blipFill>
         <p:spPr bwMode="auto">
           <a:xfrm>
-            <a:off x="1323974" y="2590800"/>
-            <a:ext cx="5381625" cy="2700650"/>
+            <a:off x="1404620" y="1170305"/>
+            <a:ext cx="5725160" cy="3031490"/>
           </a:xfrm>
           <a:prstGeom prst="rect">
             <a:avLst/>
           </a:prstGeom>
           <a:noFill/>
           <a:ln>
-            <a:noFill/>
+            <a:solidFill>
+              <a:schemeClr val="accent1"/>
+            </a:solidFill>
           </a:ln>
-          <a:effectLst/>
-          <a:extLst>
-            <a:ext uri="{909E8E84-426E-40DD-AFC4-6F175D3DCCD1}">
-              <a14:hiddenFill xmlns:a14="http://schemas.microsoft.com/office/drawing/2010/main">
-                <a:solidFill>
-                  <a:schemeClr val="accent1"/>
-                </a:solidFill>
-              </a14:hiddenFill>
-            </a:ext>
-            <a:ext uri="{91240B29-F687-4F45-9708-019B960494DF}">
-              <a14:hiddenLine xmlns:a14="http://schemas.microsoft.com/office/drawing/2010/main" w="9525">
-                <a:solidFill>
-                  <a:schemeClr val="tx1"/>
-                </a:solidFill>
-                <a:miter lim="800000"/>
-                <a:headEnd/>
-                <a:tailEnd/>
-              </a14:hiddenLine>
-            </a:ext>
-            <a:ext uri="{AF507438-7753-43E0-B8FC-AC1667EBCBE1}">
-              <a14:hiddenEffects xmlns:a14="http://schemas.microsoft.com/office/drawing/2010/main">
-                <a:effectLst>
-                  <a:outerShdw dist="35921" dir="2700000" algn="ctr" rotWithShape="0">
-                    <a:schemeClr val="bg2"/>
-                  </a:outerShdw>
-                </a:effectLst>
-              </a14:hiddenEffects>
-            </a:ext>
-          </a:extLst>
         </p:spPr>
       </p:pic>
     </p:spTree>

</xml_diff>